<commit_message>
Finished poster draft @klevan @cflagg
</commit_message>
<xml_diff>
--- a/Poster Images/PosterTemplateGeneralLayout.pptx
+++ b/Poster Images/PosterTemplateGeneralLayout.pptx
@@ -14,7 +14,7 @@
     <p:sldId id="257" r:id="rId5"/>
   </p:sldIdLst>
   <p:sldSz cx="43891200" cy="32918400"/>
-  <p:notesSz cx="9236075" cy="6954838"/>
+  <p:notesSz cx="9309100" cy="7023100"/>
   <p:defaultTextStyle>
     <a:defPPr>
       <a:defRPr lang="en-US"/>
@@ -212,12 +212,12 @@
     </p:ext>
     <p:ext uri="{2D200454-40CA-4A62-9FC3-DE9A4176ACB9}">
       <p15:notesGuideLst xmlns:p15="http://schemas.microsoft.com/office/powerpoint/2012/main">
-        <p15:guide id="1" orient="horz" pos="2191" userDrawn="1">
+        <p15:guide id="1" orient="horz" pos="2213" userDrawn="1">
           <p15:clr>
             <a:srgbClr val="A4A3A4"/>
           </p15:clr>
         </p15:guide>
-        <p15:guide id="2" pos="2909" userDrawn="1">
+        <p15:guide id="2" pos="2932" userDrawn="1">
           <p15:clr>
             <a:srgbClr val="A4A3A4"/>
           </p15:clr>
@@ -262,15 +262,15 @@
         </p:nvSpPr>
         <p:spPr>
           <a:xfrm>
-            <a:off x="1" y="0"/>
-            <a:ext cx="4002299" cy="347742"/>
+            <a:off x="2" y="0"/>
+            <a:ext cx="4033943" cy="351155"/>
           </a:xfrm>
           <a:prstGeom prst="rect">
             <a:avLst/>
           </a:prstGeom>
         </p:spPr>
         <p:txBody>
-          <a:bodyPr vert="horz" lIns="92512" tIns="46256" rIns="92512" bIns="46256" rtlCol="0"/>
+          <a:bodyPr vert="horz" lIns="93317" tIns="46658" rIns="93317" bIns="46658" rtlCol="0"/>
           <a:lstStyle>
             <a:lvl1pPr algn="l">
               <a:defRPr sz="1200"/>
@@ -293,15 +293,15 @@
         </p:nvSpPr>
         <p:spPr>
           <a:xfrm>
-            <a:off x="1" y="6605889"/>
-            <a:ext cx="4002299" cy="347742"/>
+            <a:off x="2" y="6670726"/>
+            <a:ext cx="4033943" cy="351155"/>
           </a:xfrm>
           <a:prstGeom prst="rect">
             <a:avLst/>
           </a:prstGeom>
         </p:spPr>
         <p:txBody>
-          <a:bodyPr vert="horz" lIns="92512" tIns="46256" rIns="92512" bIns="46256" rtlCol="0" anchor="b"/>
+          <a:bodyPr vert="horz" lIns="93317" tIns="46658" rIns="93317" bIns="46658" rtlCol="0" anchor="b"/>
           <a:lstStyle>
             <a:lvl1pPr algn="l">
               <a:defRPr sz="1200"/>
@@ -324,15 +324,15 @@
         </p:nvSpPr>
         <p:spPr>
           <a:xfrm>
-            <a:off x="5231640" y="6605889"/>
-            <a:ext cx="4002299" cy="347742"/>
+            <a:off x="5273005" y="6670726"/>
+            <a:ext cx="4033943" cy="351155"/>
           </a:xfrm>
           <a:prstGeom prst="rect">
             <a:avLst/>
           </a:prstGeom>
         </p:spPr>
         <p:txBody>
-          <a:bodyPr vert="horz" lIns="92512" tIns="46256" rIns="92512" bIns="46256" rtlCol="0" anchor="b"/>
+          <a:bodyPr vert="horz" lIns="93317" tIns="46658" rIns="93317" bIns="46658" rtlCol="0" anchor="b"/>
           <a:lstStyle>
             <a:lvl1pPr algn="r">
               <a:defRPr sz="1200"/>
@@ -392,15 +392,15 @@
         </p:nvSpPr>
         <p:spPr>
           <a:xfrm>
-            <a:off x="1" y="0"/>
-            <a:ext cx="4002299" cy="347742"/>
+            <a:off x="2" y="0"/>
+            <a:ext cx="4033943" cy="351155"/>
           </a:xfrm>
           <a:prstGeom prst="rect">
             <a:avLst/>
           </a:prstGeom>
         </p:spPr>
         <p:txBody>
-          <a:bodyPr vert="horz" lIns="92512" tIns="46256" rIns="92512" bIns="46256" rtlCol="0"/>
+          <a:bodyPr vert="horz" lIns="93317" tIns="46658" rIns="93317" bIns="46658" rtlCol="0"/>
           <a:lstStyle>
             <a:lvl1pPr algn="l">
               <a:defRPr sz="1200"/>
@@ -423,15 +423,15 @@
         </p:nvSpPr>
         <p:spPr>
           <a:xfrm>
-            <a:off x="5231640" y="0"/>
-            <a:ext cx="4002299" cy="347742"/>
+            <a:off x="5273005" y="0"/>
+            <a:ext cx="4033943" cy="351155"/>
           </a:xfrm>
           <a:prstGeom prst="rect">
             <a:avLst/>
           </a:prstGeom>
         </p:spPr>
         <p:txBody>
-          <a:bodyPr vert="horz" lIns="92512" tIns="46256" rIns="92512" bIns="46256" rtlCol="0"/>
+          <a:bodyPr vert="horz" lIns="93317" tIns="46658" rIns="93317" bIns="46658" rtlCol="0"/>
           <a:lstStyle>
             <a:lvl1pPr algn="r">
               <a:defRPr sz="1200"/>
@@ -440,7 +440,7 @@
           <a:p>
             <a:fld id="{7331ACB9-526E-470E-B6E8-6F01B6FDD3E2}" type="datetimeFigureOut">
               <a:rPr lang="en-US" smtClean="0"/>
-              <a:t>7/21/2017</a:t>
+              <a:t>7/28/2017</a:t>
             </a:fld>
             <a:endParaRPr lang="en-US"/>
           </a:p>
@@ -458,8 +458,8 @@
         </p:nvSpPr>
         <p:spPr>
           <a:xfrm>
-            <a:off x="2879725" y="522288"/>
-            <a:ext cx="3476625" cy="2608262"/>
+            <a:off x="2898775" y="527050"/>
+            <a:ext cx="3511550" cy="2633663"/>
           </a:xfrm>
           <a:prstGeom prst="rect">
             <a:avLst/>
@@ -472,7 +472,7 @@
           </a:ln>
         </p:spPr>
         <p:txBody>
-          <a:bodyPr vert="horz" lIns="92512" tIns="46256" rIns="92512" bIns="46256" rtlCol="0" anchor="ctr"/>
+          <a:bodyPr vert="horz" lIns="93317" tIns="46658" rIns="93317" bIns="46658" rtlCol="0" anchor="ctr"/>
           <a:lstStyle/>
           <a:p>
             <a:endParaRPr lang="en-US"/>
@@ -491,15 +491,15 @@
         </p:nvSpPr>
         <p:spPr>
           <a:xfrm>
-            <a:off x="923608" y="3303549"/>
-            <a:ext cx="7388860" cy="3129677"/>
+            <a:off x="930911" y="3335974"/>
+            <a:ext cx="7447280" cy="3160395"/>
           </a:xfrm>
           <a:prstGeom prst="rect">
             <a:avLst/>
           </a:prstGeom>
         </p:spPr>
         <p:txBody>
-          <a:bodyPr vert="horz" lIns="92512" tIns="46256" rIns="92512" bIns="46256" rtlCol="0"/>
+          <a:bodyPr vert="horz" lIns="93317" tIns="46658" rIns="93317" bIns="46658" rtlCol="0"/>
           <a:lstStyle/>
           <a:p>
             <a:pPr lvl="0"/>
@@ -551,15 +551,15 @@
         </p:nvSpPr>
         <p:spPr>
           <a:xfrm>
-            <a:off x="1" y="6605889"/>
-            <a:ext cx="4002299" cy="347742"/>
+            <a:off x="2" y="6670726"/>
+            <a:ext cx="4033943" cy="351155"/>
           </a:xfrm>
           <a:prstGeom prst="rect">
             <a:avLst/>
           </a:prstGeom>
         </p:spPr>
         <p:txBody>
-          <a:bodyPr vert="horz" lIns="92512" tIns="46256" rIns="92512" bIns="46256" rtlCol="0" anchor="b"/>
+          <a:bodyPr vert="horz" lIns="93317" tIns="46658" rIns="93317" bIns="46658" rtlCol="0" anchor="b"/>
           <a:lstStyle>
             <a:lvl1pPr algn="l">
               <a:defRPr sz="1200"/>
@@ -582,15 +582,15 @@
         </p:nvSpPr>
         <p:spPr>
           <a:xfrm>
-            <a:off x="5231640" y="6605889"/>
-            <a:ext cx="4002299" cy="347742"/>
+            <a:off x="5273005" y="6670726"/>
+            <a:ext cx="4033943" cy="351155"/>
           </a:xfrm>
           <a:prstGeom prst="rect">
             <a:avLst/>
           </a:prstGeom>
         </p:spPr>
         <p:txBody>
-          <a:bodyPr vert="horz" lIns="92512" tIns="46256" rIns="92512" bIns="46256" rtlCol="0" anchor="b"/>
+          <a:bodyPr vert="horz" lIns="93317" tIns="46658" rIns="93317" bIns="46658" rtlCol="0" anchor="b"/>
           <a:lstStyle>
             <a:lvl1pPr algn="r">
               <a:defRPr sz="1200"/>
@@ -1648,39 +1648,6 @@
       </p:grpSpPr>
       <p:sp>
         <p:nvSpPr>
-          <p:cNvPr id="7" name="TextBox 6"/>
-          <p:cNvSpPr txBox="1"/>
-          <p:nvPr/>
-        </p:nvSpPr>
-        <p:spPr>
-          <a:xfrm>
-            <a:off x="939556" y="4250884"/>
-            <a:ext cx="4192855" cy="769441"/>
-          </a:xfrm>
-          <a:prstGeom prst="rect">
-            <a:avLst/>
-          </a:prstGeom>
-          <a:noFill/>
-        </p:spPr>
-        <p:txBody>
-          <a:bodyPr wrap="none" lIns="0" tIns="0" rIns="0" bIns="0" rtlCol="0">
-            <a:spAutoFit/>
-          </a:bodyPr>
-          <a:lstStyle/>
-          <a:p>
-            <a:r>
-              <a:rPr lang="en-US" sz="5000" dirty="0">
-                <a:solidFill>
-                  <a:srgbClr val="A9CFF6"/>
-                </a:solidFill>
-              </a:rPr>
-              <a:t>C. Howman, T. </a:t>
-            </a:r>
-          </a:p>
-        </p:txBody>
-      </p:sp>
-      <p:sp>
-        <p:nvSpPr>
           <p:cNvPr id="42" name="Rectangle 41"/>
           <p:cNvSpPr>
             <a:spLocks/>
@@ -1689,8 +1656,8 @@
         </p:nvSpPr>
         <p:spPr>
           <a:xfrm>
-            <a:off x="11607557" y="15776952"/>
-            <a:ext cx="20726399" cy="13489984"/>
+            <a:off x="11607557" y="15465722"/>
+            <a:ext cx="20726399" cy="14135030"/>
           </a:xfrm>
           <a:prstGeom prst="rect">
             <a:avLst/>
@@ -1736,6 +1703,44 @@
       </p:sp>
       <p:sp>
         <p:nvSpPr>
+          <p:cNvPr id="7" name="TextBox 6"/>
+          <p:cNvSpPr txBox="1"/>
+          <p:nvPr/>
+        </p:nvSpPr>
+        <p:spPr>
+          <a:xfrm>
+            <a:off x="939556" y="4250884"/>
+            <a:ext cx="4841069" cy="769441"/>
+          </a:xfrm>
+          <a:prstGeom prst="rect">
+            <a:avLst/>
+          </a:prstGeom>
+          <a:noFill/>
+        </p:spPr>
+        <p:txBody>
+          <a:bodyPr wrap="none" lIns="0" tIns="0" rIns="0" bIns="0" rtlCol="0">
+            <a:spAutoFit/>
+          </a:bodyPr>
+          <a:lstStyle/>
+          <a:p>
+            <a:r>
+              <a:rPr lang="en-US" sz="5000" dirty="0" smtClean="0">
+                <a:solidFill>
+                  <a:srgbClr val="A9CFF6"/>
+                </a:solidFill>
+              </a:rPr>
+              <a:t>Charlotte Roiger </a:t>
+            </a:r>
+            <a:endParaRPr lang="en-US" sz="5000" dirty="0">
+              <a:solidFill>
+                <a:srgbClr val="A9CFF6"/>
+              </a:solidFill>
+            </a:endParaRPr>
+          </a:p>
+        </p:txBody>
+      </p:sp>
+      <p:sp>
+        <p:nvSpPr>
           <p:cNvPr id="43" name="Rectangle 42"/>
           <p:cNvSpPr>
             <a:spLocks/>
@@ -1744,8 +1749,8 @@
         </p:nvSpPr>
         <p:spPr>
           <a:xfrm>
-            <a:off x="939556" y="7454135"/>
-            <a:ext cx="10058400" cy="10683241"/>
+            <a:off x="939556" y="7387461"/>
+            <a:ext cx="10029716" cy="9071740"/>
           </a:xfrm>
           <a:prstGeom prst="rect">
             <a:avLst/>
@@ -1778,70 +1783,135 @@
           <a:lstStyle/>
           <a:p>
             <a:r>
-              <a:rPr lang="en-US" sz="2800" dirty="0" smtClean="0">
-                <a:latin typeface="Arial"/>
-                <a:cs typeface="Arial"/>
-              </a:rPr>
-              <a:t>This is where my abstract would be. This is filler ,but I know I need to cut down my abstract.</a:t>
-            </a:r>
-          </a:p>
-          <a:p>
-            <a:endParaRPr lang="en-US" sz="2800" dirty="0">
-              <a:latin typeface="Arial"/>
+              <a:rPr lang="en-US" sz="2600" b="1" dirty="0" smtClean="0">
+                <a:cs typeface="Arial"/>
+              </a:rPr>
+              <a:t>Background: </a:t>
+            </a:r>
+            <a:r>
+              <a:rPr lang="en-US" sz="2600" dirty="0" smtClean="0">
+                <a:cs typeface="Arial"/>
+              </a:rPr>
+              <a:t>The </a:t>
+            </a:r>
+            <a:r>
+              <a:rPr lang="en-US" sz="2600" dirty="0">
+                <a:cs typeface="Arial"/>
+              </a:rPr>
+              <a:t>study of mosquitoes is important because of their roles as members of food chains, carriers for human diseases, and as a sentinel taxon for climate </a:t>
+            </a:r>
+            <a:r>
+              <a:rPr lang="en-US" sz="2600" dirty="0" smtClean="0">
+                <a:cs typeface="Arial"/>
+              </a:rPr>
+              <a:t>change</a:t>
+            </a:r>
+            <a:r>
+              <a:rPr lang="en-US" sz="2600" baseline="30000" dirty="0" smtClean="0">
+                <a:cs typeface="Arial"/>
+              </a:rPr>
+              <a:t>1</a:t>
+            </a:r>
+            <a:r>
+              <a:rPr lang="en-US" sz="2600" dirty="0" smtClean="0">
+                <a:cs typeface="Arial"/>
+              </a:rPr>
+              <a:t>. The </a:t>
+            </a:r>
+            <a:r>
+              <a:rPr lang="en-US" sz="2600" dirty="0">
+                <a:cs typeface="Arial"/>
+              </a:rPr>
+              <a:t>National Ecological Observatory Network (NEON) will be collecting mosquito occurrence, identification, and pathogen data at 47 terrestrial sites over the next 30 years. </a:t>
+            </a:r>
+            <a:endParaRPr lang="en-US" sz="2600" dirty="0" smtClean="0">
               <a:cs typeface="Arial"/>
             </a:endParaRPr>
           </a:p>
           <a:p>
-            <a:endParaRPr lang="en-US" sz="2800" dirty="0" smtClean="0">
-              <a:latin typeface="Arial"/>
+            <a:endParaRPr lang="en-US" sz="2000" dirty="0">
               <a:cs typeface="Arial"/>
             </a:endParaRPr>
           </a:p>
           <a:p>
             <a:r>
-              <a:rPr lang="en-US" sz="2800" b="1" dirty="0" smtClean="0">
-                <a:latin typeface="Arial"/>
-                <a:cs typeface="Arial"/>
-              </a:rPr>
-              <a:t>Goals</a:t>
-            </a:r>
-            <a:r>
-              <a:rPr lang="en-US" sz="2800" dirty="0" smtClean="0">
-                <a:latin typeface="Arial"/>
-                <a:cs typeface="Arial"/>
-              </a:rPr>
-              <a:t>:  </a:t>
-            </a:r>
-          </a:p>
-          <a:p>
-            <a:pPr marL="457200" indent="-457200">
-              <a:buFont typeface="Arial" panose="020B0604020202020204" pitchFamily="34" charset="0"/>
-              <a:buChar char="•"/>
-            </a:pPr>
-            <a:r>
-              <a:rPr lang="en-US" sz="2800" dirty="0" smtClean="0">
-                <a:latin typeface="Arial"/>
-                <a:cs typeface="Arial"/>
-              </a:rPr>
-              <a:t>The goals of my project would go here</a:t>
-            </a:r>
-          </a:p>
-          <a:p>
-            <a:pPr marL="457200" indent="-457200">
-              <a:buFont typeface="Arial" panose="020B0604020202020204" pitchFamily="34" charset="0"/>
-              <a:buChar char="•"/>
-            </a:pPr>
-            <a:r>
-              <a:rPr lang="en-US" sz="2800" dirty="0" smtClean="0">
-                <a:latin typeface="Arial"/>
-                <a:cs typeface="Arial"/>
-              </a:rPr>
-              <a:t>Here is another goal #wow</a:t>
-            </a:r>
-            <a:endParaRPr lang="en-US" sz="2800" dirty="0" smtClean="0">
-              <a:latin typeface="Arial"/>
-              <a:cs typeface="Arial"/>
-            </a:endParaRPr>
+              <a:rPr lang="en-US" sz="2600" b="1" dirty="0" smtClean="0">
+                <a:cs typeface="Arial"/>
+              </a:rPr>
+              <a:t>Project Goals: </a:t>
+            </a:r>
+            <a:r>
+              <a:rPr lang="en-US" sz="2600" dirty="0" smtClean="0">
+                <a:cs typeface="Arial"/>
+              </a:rPr>
+              <a:t>The </a:t>
+            </a:r>
+            <a:r>
+              <a:rPr lang="en-US" sz="2600" dirty="0">
+                <a:cs typeface="Arial"/>
+              </a:rPr>
+              <a:t>aim of this research project is to develop and provide future data users with methods and examples of working with NEON mosquito data to facilitate data analysis and visualization using the R programming language. We present a general workflow for downloading, merging, and processing data from NEON’s mosquito data product to explore and visualize species richness across all NEON sites. The tutorial includes examples of how to combine field observations with meteorological data to explore the relationship between mosquito species richness and temperature thresholds. </a:t>
+            </a:r>
+            <a:r>
+              <a:rPr lang="en-US" sz="2600" dirty="0" smtClean="0">
+                <a:cs typeface="Arial"/>
+              </a:rPr>
+              <a:t>The </a:t>
+            </a:r>
+            <a:r>
+              <a:rPr lang="en-US" sz="2600" dirty="0">
+                <a:cs typeface="Arial"/>
+              </a:rPr>
+              <a:t>broad spatial distribution of NEON sites may enable early detection of mosquito species range expansion. </a:t>
+            </a:r>
+            <a:r>
+              <a:rPr lang="en-US" sz="2600" dirty="0" smtClean="0">
+                <a:cs typeface="Arial"/>
+              </a:rPr>
+              <a:t>We </a:t>
+            </a:r>
+            <a:r>
+              <a:rPr lang="en-US" sz="2600" dirty="0">
+                <a:cs typeface="Arial"/>
+              </a:rPr>
+              <a:t>show how these data can be used to analyze the presence or absence of a single species, </a:t>
+            </a:r>
+            <a:r>
+              <a:rPr lang="en-US" sz="2600" i="1" dirty="0" err="1">
+                <a:cs typeface="Arial"/>
+              </a:rPr>
+              <a:t>Culex</a:t>
+            </a:r>
+            <a:r>
+              <a:rPr lang="en-US" sz="2600" i="1" dirty="0">
+                <a:cs typeface="Arial"/>
+              </a:rPr>
+              <a:t> </a:t>
+            </a:r>
+            <a:r>
+              <a:rPr lang="en-US" sz="2600" i="1" dirty="0" err="1">
+                <a:cs typeface="Arial"/>
+              </a:rPr>
+              <a:t>tarsalis</a:t>
+            </a:r>
+            <a:r>
+              <a:rPr lang="en-US" sz="2600" dirty="0">
+                <a:cs typeface="Arial"/>
+              </a:rPr>
+              <a:t>, across </a:t>
+            </a:r>
+            <a:r>
+              <a:rPr lang="en-US" sz="2600" dirty="0" smtClean="0">
+                <a:cs typeface="Arial"/>
+              </a:rPr>
+              <a:t>NEON sites</a:t>
+            </a:r>
+            <a:r>
+              <a:rPr lang="en-US" sz="2600" dirty="0">
+                <a:cs typeface="Arial"/>
+              </a:rPr>
+              <a:t>.</a:t>
+            </a:r>
           </a:p>
         </p:txBody>
       </p:sp>
@@ -1897,15 +1967,8 @@
                 <a:latin typeface="Century Gothic"/>
                 <a:cs typeface="Century Gothic"/>
               </a:rPr>
-              <a:t>Introduction/Abstract</a:t>
-            </a:r>
-            <a:endParaRPr lang="en-US" sz="4000" b="1" dirty="0" smtClean="0">
-              <a:solidFill>
-                <a:schemeClr val="bg1"/>
-              </a:solidFill>
-              <a:latin typeface="Century Gothic"/>
-              <a:cs typeface="Century Gothic"/>
-            </a:endParaRPr>
+              <a:t>Introduction</a:t>
+            </a:r>
           </a:p>
         </p:txBody>
       </p:sp>
@@ -1952,65 +2015,10 @@
           </a:bodyPr>
           <a:lstStyle/>
           <a:p>
-            <a:pPr marL="3200400"/>
-            <a:r>
-              <a:rPr lang="en-US" sz="2600" dirty="0" smtClean="0">
-                <a:latin typeface="Arial"/>
-                <a:cs typeface="Arial"/>
-              </a:rPr>
-              <a:t>Here I will have a scatterplot of species richness by latitude and briefly go into how species richness was developed from the data</a:t>
-            </a:r>
-            <a:endParaRPr lang="en-US" sz="2600" dirty="0" smtClean="0">
-              <a:latin typeface="Arial"/>
-              <a:cs typeface="Arial"/>
-            </a:endParaRPr>
-          </a:p>
-          <a:p>
-            <a:pPr marL="3200400"/>
-            <a:endParaRPr lang="en-US" sz="2600" dirty="0" smtClean="0">
-              <a:latin typeface="Arial"/>
-              <a:cs typeface="Arial"/>
-            </a:endParaRPr>
-          </a:p>
-          <a:p>
-            <a:pPr marL="3200400"/>
-            <a:r>
-              <a:rPr lang="en-US" sz="2600" dirty="0" smtClean="0">
-                <a:latin typeface="Arial"/>
-                <a:cs typeface="Arial"/>
-              </a:rPr>
-              <a:t>FILLER TEXT</a:t>
-            </a:r>
-            <a:endParaRPr lang="en-US" sz="2600" dirty="0" smtClean="0">
-              <a:latin typeface="Arial"/>
-              <a:cs typeface="Arial"/>
-            </a:endParaRPr>
-          </a:p>
-          <a:p>
-            <a:pPr marL="3200400"/>
-            <a:r>
-              <a:rPr lang="en-US" sz="2600" dirty="0" smtClean="0">
-                <a:latin typeface="Arial"/>
-                <a:cs typeface="Arial"/>
-              </a:rPr>
-              <a:t>This set up could work well for an image and then text next to it. The three text boxes here have the same header color because they all go together. If I wanted the text to extend back out below the image on the </a:t>
-            </a:r>
-            <a:r>
-              <a:rPr lang="en-US" sz="2600" dirty="0" smtClean="0">
-                <a:latin typeface="Arial"/>
-                <a:cs typeface="Arial"/>
-              </a:rPr>
-              <a:t>left</a:t>
-            </a:r>
-            <a:r>
-              <a:rPr lang="en-US" sz="2600" dirty="0" smtClean="0">
-                <a:latin typeface="Arial"/>
-                <a:cs typeface="Arial"/>
-              </a:rPr>
-              <a:t>, I just change the margin again for that paragraph.</a:t>
-            </a:r>
-          </a:p>
-          <a:p>
+            <a:pPr indent="-457200">
+              <a:buFont typeface="Arial" panose="020B0604020202020204" pitchFamily="34" charset="0"/>
+              <a:buChar char="•"/>
+            </a:pPr>
             <a:endParaRPr lang="en-US" sz="2600" dirty="0" smtClean="0">
               <a:latin typeface="Arial"/>
               <a:cs typeface="Arial"/>
@@ -2070,7 +2078,7 @@
                 <a:latin typeface="Century Gothic"/>
                 <a:cs typeface="Century Gothic"/>
               </a:rPr>
-              <a:t>Species Richness by Latitude</a:t>
+              <a:t>Vignette One: Species Richness</a:t>
             </a:r>
             <a:endParaRPr lang="en-US" sz="3200" b="1" dirty="0" smtClean="0">
               <a:solidFill>
@@ -2134,7 +2142,7 @@
                 <a:latin typeface="Century Gothic"/>
                 <a:cs typeface="Century Gothic"/>
               </a:rPr>
-              <a:t>Species Richness by Temperature</a:t>
+              <a:t>Vignette One: Species Richness</a:t>
             </a:r>
             <a:endParaRPr lang="en-US" sz="3200" b="1" dirty="0" smtClean="0">
               <a:solidFill>
@@ -2154,8 +2162,8 @@
         </p:nvSpPr>
         <p:spPr>
           <a:xfrm>
-            <a:off x="32943863" y="6402576"/>
-            <a:ext cx="10058400" cy="861774"/>
+            <a:off x="32972239" y="14243348"/>
+            <a:ext cx="10058400" cy="800219"/>
           </a:xfrm>
           <a:prstGeom prst="rect">
             <a:avLst/>
@@ -2191,17 +2199,17 @@
           <a:p>
             <a:pPr algn="ctr"/>
             <a:r>
-              <a:rPr lang="en-US" sz="3200" b="1" dirty="0" smtClean="0">
+              <a:rPr lang="en-US" sz="2800" b="1" dirty="0" smtClean="0">
                 <a:solidFill>
                   <a:schemeClr val="bg1"/>
                 </a:solidFill>
                 <a:latin typeface="Century Gothic"/>
                 <a:cs typeface="Century Gothic"/>
               </a:rPr>
-              <a:t>Abundance of </a:t>
-            </a:r>
-            <a:r>
-              <a:rPr lang="en-US" sz="3200" b="1" dirty="0" err="1" smtClean="0">
+              <a:t>Vignette Two: Abundance and Range of </a:t>
+            </a:r>
+            <a:r>
+              <a:rPr lang="en-US" sz="2800" b="1" dirty="0" err="1" smtClean="0">
                 <a:solidFill>
                   <a:schemeClr val="bg1"/>
                 </a:solidFill>
@@ -2211,7 +2219,7 @@
               <a:t>Culex</a:t>
             </a:r>
             <a:r>
-              <a:rPr lang="en-US" sz="3200" b="1" dirty="0" smtClean="0">
+              <a:rPr lang="en-US" sz="2800" b="1" dirty="0" smtClean="0">
                 <a:solidFill>
                   <a:schemeClr val="bg1"/>
                 </a:solidFill>
@@ -2221,26 +2229,16 @@
               <a:t> </a:t>
             </a:r>
             <a:r>
-              <a:rPr lang="en-US" sz="3200" b="1" dirty="0" err="1" smtClean="0">
+              <a:rPr lang="en-US" sz="2800" b="1" dirty="0" err="1" smtClean="0">
                 <a:solidFill>
                   <a:schemeClr val="bg1"/>
                 </a:solidFill>
                 <a:latin typeface="Century Gothic"/>
                 <a:cs typeface="Century Gothic"/>
               </a:rPr>
-              <a:t>Tarsalis</a:t>
-            </a:r>
-            <a:r>
-              <a:rPr lang="en-US" sz="3200" b="1" dirty="0" smtClean="0">
-                <a:solidFill>
-                  <a:schemeClr val="bg1"/>
-                </a:solidFill>
-                <a:latin typeface="Century Gothic"/>
-                <a:cs typeface="Century Gothic"/>
-              </a:rPr>
-              <a:t> Over Time</a:t>
-            </a:r>
-            <a:endParaRPr lang="en-US" sz="3200" b="1" dirty="0" smtClean="0">
+              <a:t>tarsalis</a:t>
+            </a:r>
+            <a:endParaRPr lang="en-US" sz="2800" b="1" dirty="0" smtClean="0">
               <a:solidFill>
                 <a:schemeClr val="bg1"/>
               </a:solidFill>
@@ -2260,8 +2258,8 @@
         </p:nvSpPr>
         <p:spPr>
           <a:xfrm>
-            <a:off x="910873" y="19434849"/>
-            <a:ext cx="10058400" cy="9839875"/>
+            <a:off x="939556" y="17770114"/>
+            <a:ext cx="10058400" cy="11830638"/>
           </a:xfrm>
           <a:prstGeom prst="rect">
             <a:avLst/>
@@ -2294,51 +2292,535 @@
           <a:lstStyle/>
           <a:p>
             <a:r>
-              <a:rPr lang="en-US" sz="2800" dirty="0" smtClean="0">
+              <a:rPr lang="en-US" sz="2800" b="1" dirty="0" smtClean="0">
+                <a:solidFill>
+                  <a:schemeClr val="accent2"/>
+                </a:solidFill>
                 <a:latin typeface="Arial"/>
                 <a:cs typeface="Arial"/>
               </a:rPr>
-              <a:t>This is where I would talk about some of the challenges and methods I used to address these challenges, general break down:</a:t>
-            </a:r>
+              <a:t>Data Organization and Set Up</a:t>
+            </a:r>
+          </a:p>
+          <a:p>
+            <a:pPr marL="914400" indent="-457200">
+              <a:buFont typeface="Arial" panose="020B0604020202020204" pitchFamily="34" charset="0"/>
+              <a:buChar char="•"/>
+            </a:pPr>
+            <a:r>
+              <a:rPr lang="en-US" sz="2400" b="1" dirty="0" smtClean="0">
+                <a:latin typeface="Arial"/>
+                <a:cs typeface="Arial"/>
+              </a:rPr>
+              <a:t>Retrieve NEON Location </a:t>
+            </a:r>
+            <a:r>
+              <a:rPr lang="en-US" sz="2400" b="1" dirty="0" smtClean="0">
+                <a:latin typeface="Arial"/>
+                <a:cs typeface="Arial"/>
+              </a:rPr>
+              <a:t>I</a:t>
+            </a:r>
+            <a:r>
+              <a:rPr lang="en-US" sz="2400" b="1" dirty="0" smtClean="0">
+                <a:latin typeface="Arial"/>
+                <a:cs typeface="Arial"/>
+              </a:rPr>
+              <a:t>nformation</a:t>
+            </a:r>
+          </a:p>
+          <a:p>
+            <a:pPr marL="1828800" lvl="1" indent="-457200">
+              <a:buFont typeface="Arial" panose="020B0604020202020204" pitchFamily="34" charset="0"/>
+              <a:buChar char="−"/>
+            </a:pPr>
+            <a:r>
+              <a:rPr lang="en-US" sz="2400" dirty="0" smtClean="0">
+                <a:latin typeface="Arial"/>
+                <a:cs typeface="Arial"/>
+              </a:rPr>
+              <a:t>Used a function that called NEON Application Program Interfaces to obtain location data</a:t>
+            </a:r>
+          </a:p>
+          <a:p>
+            <a:pPr marL="914400" indent="-457200">
+              <a:buFont typeface="Arial" panose="020B0604020202020204" pitchFamily="34" charset="0"/>
+              <a:buChar char="•"/>
+            </a:pPr>
+            <a:r>
+              <a:rPr lang="en-US" sz="2400" b="1" dirty="0" smtClean="0">
+                <a:latin typeface="Arial"/>
+                <a:cs typeface="Arial"/>
+              </a:rPr>
+              <a:t>Merge trapping, identification, and sorting data frames</a:t>
+            </a:r>
+          </a:p>
+          <a:p>
+            <a:pPr marL="914400" indent="-457200">
+              <a:buFont typeface="Arial" panose="020B0604020202020204" pitchFamily="34" charset="0"/>
+              <a:buChar char="•"/>
+            </a:pPr>
+            <a:endParaRPr lang="en-US" sz="800" b="1" dirty="0" smtClean="0">
+              <a:latin typeface="Arial"/>
+              <a:cs typeface="Arial"/>
+            </a:endParaRPr>
+          </a:p>
+          <a:p>
+            <a:r>
+              <a:rPr lang="en-US" sz="2800" b="1" dirty="0" smtClean="0">
+                <a:solidFill>
+                  <a:schemeClr val="accent2"/>
+                </a:solidFill>
+                <a:latin typeface="Arial"/>
+                <a:cs typeface="Arial"/>
+              </a:rPr>
+              <a:t>Vignette One: Mosquito Species Richness</a:t>
+            </a:r>
+            <a:endParaRPr lang="en-US" sz="2800" b="1" dirty="0">
+              <a:solidFill>
+                <a:schemeClr val="accent2"/>
+              </a:solidFill>
+              <a:latin typeface="Arial"/>
+              <a:cs typeface="Arial"/>
+            </a:endParaRPr>
+          </a:p>
+          <a:p>
+            <a:pPr marL="914400" indent="-457200">
+              <a:buFont typeface="Arial" panose="020B0604020202020204" pitchFamily="34" charset="0"/>
+              <a:buChar char="•"/>
+            </a:pPr>
+            <a:r>
+              <a:rPr lang="en-US" sz="2400" b="1" dirty="0" smtClean="0">
+                <a:latin typeface="Arial"/>
+                <a:cs typeface="Arial"/>
+              </a:rPr>
+              <a:t>Calculate Species Richness</a:t>
+            </a:r>
+          </a:p>
+          <a:p>
+            <a:pPr marL="1828800" lvl="1" indent="-457200">
+              <a:buFont typeface="Arial" panose="020B0604020202020204" pitchFamily="34" charset="0"/>
+              <a:buChar char="−"/>
+            </a:pPr>
+            <a:r>
+              <a:rPr lang="en-US" sz="2400" dirty="0" smtClean="0">
+                <a:latin typeface="Arial"/>
+                <a:cs typeface="Arial"/>
+              </a:rPr>
+              <a:t>Counted </a:t>
+            </a:r>
+            <a:r>
+              <a:rPr lang="en-US" sz="2400" dirty="0">
+                <a:latin typeface="Arial"/>
+                <a:cs typeface="Arial"/>
+              </a:rPr>
+              <a:t>the unique number of scientific names at each sampling </a:t>
+            </a:r>
+            <a:r>
+              <a:rPr lang="en-US" sz="2400" dirty="0" smtClean="0">
+                <a:latin typeface="Arial"/>
+                <a:cs typeface="Arial"/>
+              </a:rPr>
+              <a:t>site by using the ‘</a:t>
+            </a:r>
+            <a:r>
+              <a:rPr lang="en-US" sz="2400" dirty="0" err="1" smtClean="0">
+                <a:latin typeface="Arial"/>
+                <a:cs typeface="Arial"/>
+              </a:rPr>
+              <a:t>ddply</a:t>
+            </a:r>
+            <a:r>
+              <a:rPr lang="en-US" sz="2400" dirty="0" smtClean="0">
+                <a:latin typeface="Arial"/>
+                <a:cs typeface="Arial"/>
+              </a:rPr>
+              <a:t>’ function</a:t>
+            </a:r>
+            <a:endParaRPr lang="en-US" sz="2400" dirty="0">
+              <a:latin typeface="Arial"/>
+              <a:cs typeface="Arial"/>
+            </a:endParaRPr>
+          </a:p>
+          <a:p>
+            <a:pPr marL="914400" indent="-457200">
+              <a:buFont typeface="Arial" panose="020B0604020202020204" pitchFamily="34" charset="0"/>
+              <a:buChar char="•"/>
+            </a:pPr>
+            <a:r>
+              <a:rPr lang="en-US" sz="2400" b="1" dirty="0" smtClean="0">
+                <a:latin typeface="Arial"/>
+                <a:cs typeface="Arial"/>
+              </a:rPr>
+              <a:t>Create Temperature and Degree Day Variables</a:t>
+            </a:r>
+          </a:p>
+          <a:p>
+            <a:pPr marL="1828800" lvl="1" indent="-457200">
+              <a:buFont typeface="Arial" panose="020B0604020202020204" pitchFamily="34" charset="0"/>
+              <a:buChar char="−"/>
+            </a:pPr>
+            <a:r>
+              <a:rPr lang="en-US" sz="2400" dirty="0" smtClean="0">
+                <a:latin typeface="Arial"/>
+                <a:cs typeface="Arial"/>
+              </a:rPr>
+              <a:t>Created a temperature lag </a:t>
+            </a:r>
+            <a:r>
+              <a:rPr lang="en-US" sz="2400" dirty="0">
+                <a:latin typeface="Arial"/>
+                <a:cs typeface="Arial"/>
+              </a:rPr>
+              <a:t>function that calculated the average maximum temperature </a:t>
+            </a:r>
+            <a:r>
+              <a:rPr lang="en-US" sz="2400" dirty="0" smtClean="0">
+                <a:latin typeface="Arial"/>
+                <a:cs typeface="Arial"/>
+              </a:rPr>
+              <a:t>and number of days above 16</a:t>
+            </a:r>
+            <a:r>
+              <a:rPr lang="en-US" sz="2400" baseline="30000" dirty="0" smtClean="0">
+                <a:latin typeface="Arial"/>
+                <a:cs typeface="Arial"/>
+              </a:rPr>
+              <a:t>o </a:t>
+            </a:r>
+            <a:r>
+              <a:rPr lang="en-US" sz="2400" dirty="0" smtClean="0">
+                <a:latin typeface="Arial"/>
+                <a:cs typeface="Arial"/>
+              </a:rPr>
+              <a:t>Celsius two weeks prior to sampling</a:t>
+            </a:r>
+            <a:r>
+              <a:rPr lang="en-US" sz="2400" baseline="30000" dirty="0" smtClean="0">
+                <a:latin typeface="Arial"/>
+                <a:cs typeface="Arial"/>
+              </a:rPr>
+              <a:t>2</a:t>
+            </a:r>
+          </a:p>
+          <a:p>
+            <a:pPr marL="1828800" lvl="1" indent="-457200">
+              <a:buFont typeface="Arial" panose="020B0604020202020204" pitchFamily="34" charset="0"/>
+              <a:buChar char="−"/>
+            </a:pPr>
+            <a:r>
+              <a:rPr lang="en-US" sz="2400" dirty="0" smtClean="0">
+                <a:solidFill>
+                  <a:schemeClr val="tx1"/>
+                </a:solidFill>
+                <a:latin typeface="Arial"/>
+                <a:cs typeface="Arial"/>
+              </a:rPr>
+              <a:t>Applied the temperature lag function to a species richness data frame using the ‘</a:t>
+            </a:r>
+            <a:r>
+              <a:rPr lang="en-US" sz="2400" dirty="0" err="1" smtClean="0">
+                <a:solidFill>
+                  <a:schemeClr val="tx1"/>
+                </a:solidFill>
+                <a:latin typeface="Arial"/>
+                <a:cs typeface="Arial"/>
+              </a:rPr>
+              <a:t>mapply</a:t>
+            </a:r>
+            <a:r>
+              <a:rPr lang="en-US" sz="2400" dirty="0" smtClean="0">
+                <a:solidFill>
+                  <a:schemeClr val="tx1"/>
+                </a:solidFill>
+                <a:latin typeface="Arial"/>
+                <a:cs typeface="Arial"/>
+              </a:rPr>
+              <a:t>’ command</a:t>
+            </a:r>
+          </a:p>
+          <a:p>
+            <a:pPr marL="1828800" lvl="1" indent="-457200">
+              <a:buFont typeface="Arial" panose="020B0604020202020204" pitchFamily="34" charset="0"/>
+              <a:buChar char="−"/>
+            </a:pPr>
+            <a:endParaRPr lang="en-US" sz="800" dirty="0" smtClean="0">
+              <a:solidFill>
+                <a:schemeClr val="tx1"/>
+              </a:solidFill>
+              <a:latin typeface="Arial"/>
+              <a:cs typeface="Arial"/>
+            </a:endParaRPr>
+          </a:p>
+          <a:p>
+            <a:r>
+              <a:rPr lang="en-US" sz="2800" b="1" dirty="0">
+                <a:solidFill>
+                  <a:schemeClr val="accent2"/>
+                </a:solidFill>
+                <a:latin typeface="Arial"/>
+                <a:cs typeface="Arial"/>
+              </a:rPr>
+              <a:t>Vignette </a:t>
+            </a:r>
+            <a:r>
+              <a:rPr lang="en-US" sz="2800" b="1" dirty="0" smtClean="0">
+                <a:solidFill>
+                  <a:schemeClr val="accent2"/>
+                </a:solidFill>
+                <a:latin typeface="Arial"/>
+                <a:cs typeface="Arial"/>
+              </a:rPr>
+              <a:t>Two: </a:t>
+            </a:r>
+            <a:r>
+              <a:rPr lang="en-US" sz="2800" b="1" dirty="0">
+                <a:solidFill>
+                  <a:schemeClr val="accent2"/>
+                </a:solidFill>
+                <a:latin typeface="Arial"/>
+                <a:cs typeface="Arial"/>
+              </a:rPr>
+              <a:t>Abundance and Range of </a:t>
+            </a:r>
+            <a:r>
+              <a:rPr lang="en-US" sz="2800" b="1" i="1" dirty="0" err="1">
+                <a:solidFill>
+                  <a:schemeClr val="accent2"/>
+                </a:solidFill>
+                <a:latin typeface="Arial"/>
+                <a:cs typeface="Arial"/>
+              </a:rPr>
+              <a:t>Culex</a:t>
+            </a:r>
+            <a:r>
+              <a:rPr lang="en-US" sz="2800" b="1" i="1" dirty="0">
+                <a:solidFill>
+                  <a:schemeClr val="accent2"/>
+                </a:solidFill>
+                <a:latin typeface="Arial"/>
+                <a:cs typeface="Arial"/>
+              </a:rPr>
+              <a:t> </a:t>
+            </a:r>
+            <a:r>
+              <a:rPr lang="en-US" sz="2800" b="1" i="1" dirty="0" err="1">
+                <a:solidFill>
+                  <a:schemeClr val="accent2"/>
+                </a:solidFill>
+                <a:latin typeface="Arial"/>
+                <a:cs typeface="Arial"/>
+              </a:rPr>
+              <a:t>tarsalis</a:t>
+            </a:r>
+            <a:endParaRPr lang="en-US" sz="2800" b="1" i="1" dirty="0">
+              <a:solidFill>
+                <a:schemeClr val="accent2"/>
+              </a:solidFill>
+              <a:latin typeface="Arial"/>
+              <a:cs typeface="Arial"/>
+            </a:endParaRPr>
+          </a:p>
+          <a:p>
+            <a:pPr marL="914400" indent="-457200">
+              <a:buFont typeface="Arial" panose="020B0604020202020204" pitchFamily="34" charset="0"/>
+              <a:buChar char="•"/>
+            </a:pPr>
+            <a:r>
+              <a:rPr lang="en-US" sz="2400" b="1" dirty="0" smtClean="0">
+                <a:latin typeface="Arial"/>
+                <a:cs typeface="Arial"/>
+              </a:rPr>
+              <a:t>Calculate Abundance</a:t>
+            </a:r>
+          </a:p>
+          <a:p>
+            <a:pPr marL="1828800" lvl="1" indent="-457200">
+              <a:buFont typeface="Arial" panose="020B0604020202020204" pitchFamily="34" charset="0"/>
+              <a:buChar char="−"/>
+            </a:pPr>
+            <a:r>
+              <a:rPr lang="en-US" sz="2400" dirty="0" smtClean="0">
+                <a:latin typeface="Arial"/>
+                <a:cs typeface="Arial"/>
+              </a:rPr>
+              <a:t>Create a subsample multiplier to estimate the number of individuals in each sample</a:t>
+            </a:r>
+          </a:p>
+          <a:p>
+            <a:pPr marL="1828800" lvl="1" indent="-457200">
+              <a:buFont typeface="Arial" panose="020B0604020202020204" pitchFamily="34" charset="0"/>
+              <a:buChar char="−"/>
+            </a:pPr>
+            <a:r>
+              <a:rPr lang="en-US" sz="2400" dirty="0" smtClean="0">
+                <a:latin typeface="Arial"/>
+                <a:cs typeface="Arial"/>
+              </a:rPr>
+              <a:t>Sum individual count from samples by site identification and date</a:t>
+            </a:r>
+          </a:p>
+          <a:p>
+            <a:pPr marL="914400" indent="-457200">
+              <a:buFont typeface="Arial" panose="020B0604020202020204" pitchFamily="34" charset="0"/>
+              <a:buChar char="•"/>
+            </a:pPr>
+            <a:r>
+              <a:rPr lang="en-US" sz="2400" b="1" dirty="0" smtClean="0">
+                <a:latin typeface="Arial"/>
+                <a:cs typeface="Arial"/>
+              </a:rPr>
+              <a:t>Visualize </a:t>
+            </a:r>
+            <a:r>
+              <a:rPr lang="en-US" sz="2400" b="1" i="1" dirty="0" err="1" smtClean="0">
+                <a:latin typeface="Arial"/>
+                <a:cs typeface="Arial"/>
+              </a:rPr>
+              <a:t>Culex</a:t>
+            </a:r>
+            <a:r>
+              <a:rPr lang="en-US" sz="2400" b="1" i="1" dirty="0" smtClean="0">
+                <a:latin typeface="Arial"/>
+                <a:cs typeface="Arial"/>
+              </a:rPr>
+              <a:t> </a:t>
+            </a:r>
+            <a:r>
+              <a:rPr lang="en-US" sz="2400" b="1" i="1" dirty="0" err="1" smtClean="0">
+                <a:latin typeface="Arial"/>
+                <a:cs typeface="Arial"/>
+              </a:rPr>
+              <a:t>tarsalis</a:t>
+            </a:r>
+            <a:r>
+              <a:rPr lang="en-US" sz="2400" b="1" i="1" dirty="0" smtClean="0">
+                <a:latin typeface="Arial"/>
+                <a:cs typeface="Arial"/>
+              </a:rPr>
+              <a:t> </a:t>
+            </a:r>
+            <a:r>
+              <a:rPr lang="en-US" sz="2400" b="1" dirty="0" smtClean="0">
+                <a:latin typeface="Arial"/>
+                <a:cs typeface="Arial"/>
+              </a:rPr>
+              <a:t>Range</a:t>
+            </a:r>
+          </a:p>
+          <a:p>
+            <a:pPr marL="1828800" lvl="1" indent="-457200">
+              <a:buFont typeface="Arial" panose="020B0604020202020204" pitchFamily="34" charset="0"/>
+              <a:buChar char="−"/>
+            </a:pPr>
+            <a:r>
+              <a:rPr lang="en-US" sz="2400" dirty="0" smtClean="0">
+                <a:latin typeface="Arial"/>
+                <a:cs typeface="Arial"/>
+              </a:rPr>
+              <a:t>Download NEON domain </a:t>
+            </a:r>
+            <a:r>
+              <a:rPr lang="en-US" sz="2400" dirty="0" err="1" smtClean="0">
+                <a:latin typeface="Arial"/>
+                <a:cs typeface="Arial"/>
+              </a:rPr>
+              <a:t>shapefiles</a:t>
+            </a:r>
+            <a:endParaRPr lang="en-US" sz="2400" dirty="0" smtClean="0">
+              <a:latin typeface="Arial"/>
+              <a:cs typeface="Arial"/>
+            </a:endParaRPr>
+          </a:p>
+          <a:p>
+            <a:pPr marL="1828800" lvl="1" indent="-457200">
+              <a:buFont typeface="Arial" panose="020B0604020202020204" pitchFamily="34" charset="0"/>
+              <a:buChar char="−"/>
+            </a:pPr>
+            <a:r>
+              <a:rPr lang="en-US" sz="2400" dirty="0" smtClean="0">
+                <a:latin typeface="Arial"/>
+                <a:cs typeface="Arial"/>
+              </a:rPr>
+              <a:t>Create indicator variable of </a:t>
+            </a:r>
+            <a:r>
+              <a:rPr lang="en-US" sz="2400" dirty="0" err="1" smtClean="0">
+                <a:latin typeface="Arial"/>
+                <a:cs typeface="Arial"/>
+              </a:rPr>
+              <a:t>Culex</a:t>
+            </a:r>
+            <a:r>
+              <a:rPr lang="en-US" sz="2400" dirty="0" smtClean="0">
+                <a:latin typeface="Arial"/>
+                <a:cs typeface="Arial"/>
+              </a:rPr>
+              <a:t> </a:t>
+            </a:r>
+            <a:r>
+              <a:rPr lang="en-US" sz="2400" dirty="0" err="1" smtClean="0">
+                <a:latin typeface="Arial"/>
+                <a:cs typeface="Arial"/>
+              </a:rPr>
+              <a:t>tarsalis</a:t>
+            </a:r>
+            <a:r>
+              <a:rPr lang="en-US" sz="2400" dirty="0" smtClean="0">
+                <a:latin typeface="Arial"/>
+                <a:cs typeface="Arial"/>
+              </a:rPr>
+              <a:t> native status and sampling presence</a:t>
+            </a:r>
+          </a:p>
+          <a:p>
+            <a:pPr marL="1828800" lvl="1" indent="-457200">
+              <a:buFont typeface="Arial" panose="020B0604020202020204" pitchFamily="34" charset="0"/>
+              <a:buChar char="−"/>
+            </a:pPr>
+            <a:r>
+              <a:rPr lang="en-US" sz="2400" dirty="0" smtClean="0">
+                <a:latin typeface="Arial"/>
+                <a:cs typeface="Arial"/>
+              </a:rPr>
+              <a:t>Use the ‘ggplot2’ package to visualize NEON domain map</a:t>
+            </a:r>
+          </a:p>
+          <a:p>
+            <a:pPr marL="1828800" lvl="1" indent="-457200">
+              <a:buFont typeface="Arial" panose="020B0604020202020204" pitchFamily="34" charset="0"/>
+              <a:buChar char="−"/>
+            </a:pPr>
+            <a:endParaRPr lang="en-US" sz="2400" dirty="0" smtClean="0">
+              <a:latin typeface="Arial"/>
+              <a:cs typeface="Arial"/>
+            </a:endParaRPr>
+          </a:p>
+          <a:p>
+            <a:pPr marL="1828800" lvl="1" indent="-457200">
+              <a:buFont typeface="Arial" panose="020B0604020202020204" pitchFamily="34" charset="0"/>
+              <a:buChar char="−"/>
+            </a:pPr>
+            <a:endParaRPr lang="en-US" sz="2600" dirty="0" smtClean="0">
+              <a:latin typeface="Arial"/>
+              <a:cs typeface="Arial"/>
+            </a:endParaRPr>
           </a:p>
           <a:p>
             <a:pPr marL="457200" indent="-457200">
-              <a:buFontTx/>
-              <a:buChar char="-"/>
+              <a:buFont typeface="Arial" panose="020B0604020202020204" pitchFamily="34" charset="0"/>
+              <a:buChar char="•"/>
             </a:pPr>
-            <a:r>
-              <a:rPr lang="en-US" sz="2800" dirty="0" smtClean="0">
-                <a:latin typeface="Arial"/>
-                <a:cs typeface="Arial"/>
-              </a:rPr>
-              <a:t>Obtaining NEON location info from APIs</a:t>
-            </a:r>
-          </a:p>
-          <a:p>
-            <a:pPr marL="457200" indent="-457200">
-              <a:buFontTx/>
-              <a:buChar char="-"/>
+            <a:endParaRPr lang="en-US" sz="2800" dirty="0" smtClean="0">
+              <a:latin typeface="Arial"/>
+              <a:cs typeface="Arial"/>
+            </a:endParaRPr>
+          </a:p>
+          <a:p>
+            <a:pPr marL="2212719" lvl="1" indent="-457200">
+              <a:buFont typeface="Arial" panose="020B0604020202020204" pitchFamily="34" charset="0"/>
+              <a:buChar char="•"/>
             </a:pPr>
-            <a:r>
-              <a:rPr lang="en-US" sz="2800" dirty="0" smtClean="0">
-                <a:latin typeface="Arial"/>
-                <a:cs typeface="Arial"/>
-              </a:rPr>
-              <a:t>Joining data frames</a:t>
-            </a:r>
-          </a:p>
-          <a:p>
-            <a:pPr marL="457200" indent="-457200">
-              <a:buFontTx/>
-              <a:buChar char="-"/>
-            </a:pPr>
-            <a:r>
-              <a:rPr lang="en-US" sz="2800" dirty="0" smtClean="0">
-                <a:latin typeface="Arial"/>
-                <a:cs typeface="Arial"/>
-              </a:rPr>
-              <a:t>Filtering data</a:t>
-            </a:r>
             <a:endParaRPr lang="en-US" sz="2800" dirty="0" smtClean="0">
               <a:latin typeface="Arial"/>
               <a:cs typeface="Arial"/>
@@ -2354,7 +2836,7 @@
         </p:nvSpPr>
         <p:spPr>
           <a:xfrm>
-            <a:off x="939556" y="18442176"/>
+            <a:off x="939556" y="16772964"/>
             <a:ext cx="10058400" cy="984885"/>
           </a:xfrm>
           <a:prstGeom prst="rect">
@@ -2396,13 +2878,6 @@
               </a:rPr>
               <a:t>Methods</a:t>
             </a:r>
-            <a:endParaRPr lang="en-US" sz="4000" b="1" dirty="0" smtClean="0">
-              <a:solidFill>
-                <a:schemeClr val="bg1"/>
-              </a:solidFill>
-              <a:latin typeface="Century Gothic"/>
-              <a:cs typeface="Century Gothic"/>
-            </a:endParaRPr>
           </a:p>
         </p:txBody>
       </p:sp>
@@ -2414,7 +2889,7 @@
         </p:nvSpPr>
         <p:spPr>
           <a:xfrm>
-            <a:off x="11607557" y="14792067"/>
+            <a:off x="11607557" y="14243348"/>
             <a:ext cx="20726399" cy="1200329"/>
           </a:xfrm>
           <a:prstGeom prst="rect">
@@ -2460,58 +2935,44 @@
                 <a:latin typeface="Century Gothic"/>
                 <a:cs typeface="Century Gothic"/>
               </a:rPr>
-              <a:t>This Section is the Main Focus of My Poster</a:t>
-            </a:r>
-          </a:p>
-        </p:txBody>
-      </p:sp>
-      <p:sp>
-        <p:nvSpPr>
-          <p:cNvPr id="58" name="Rectangle 57"/>
-          <p:cNvSpPr/>
-          <p:nvPr/>
-        </p:nvSpPr>
-        <p:spPr>
-          <a:xfrm>
-            <a:off x="12034665" y="7915281"/>
-            <a:ext cx="2905759" cy="4114800"/>
-          </a:xfrm>
-          <a:prstGeom prst="rect">
-            <a:avLst/>
-          </a:prstGeom>
-          <a:solidFill>
-            <a:schemeClr val="bg2"/>
-          </a:solidFill>
-          <a:ln>
-            <a:noFill/>
-          </a:ln>
-        </p:spPr>
-        <p:style>
-          <a:lnRef idx="1">
-            <a:schemeClr val="accent2"/>
-          </a:lnRef>
-          <a:fillRef idx="2">
-            <a:schemeClr val="accent2"/>
-          </a:fillRef>
-          <a:effectRef idx="1">
-            <a:schemeClr val="accent2"/>
-          </a:effectRef>
-          <a:fontRef idx="minor">
-            <a:schemeClr val="dk1"/>
-          </a:fontRef>
-        </p:style>
-        <p:txBody>
-          <a:bodyPr wrap="square" rtlCol="0" anchor="ctr">
-            <a:spAutoFit/>
-          </a:bodyPr>
-          <a:lstStyle/>
-          <a:p>
-            <a:pPr algn="ctr"/>
-            <a:endParaRPr lang="en-US" sz="3600" b="1" baseline="0" dirty="0" smtClean="0">
+              <a:t>Vignette Two: Abundance and Range of </a:t>
+            </a:r>
+            <a:r>
+              <a:rPr lang="en-US" sz="5400" b="1" dirty="0" err="1" smtClean="0">
+                <a:solidFill>
+                  <a:schemeClr val="bg1"/>
+                </a:solidFill>
+                <a:latin typeface="Century Gothic"/>
+                <a:cs typeface="Century Gothic"/>
+              </a:rPr>
+              <a:t>Culex</a:t>
+            </a:r>
+            <a:r>
+              <a:rPr lang="en-US" sz="5400" b="1" dirty="0" smtClean="0">
+                <a:solidFill>
+                  <a:schemeClr val="bg1"/>
+                </a:solidFill>
+                <a:latin typeface="Century Gothic"/>
+                <a:cs typeface="Century Gothic"/>
+              </a:rPr>
+              <a:t> </a:t>
+            </a:r>
+            <a:r>
+              <a:rPr lang="en-US" sz="5400" b="1" dirty="0" err="1" smtClean="0">
+                <a:solidFill>
+                  <a:schemeClr val="bg1"/>
+                </a:solidFill>
+                <a:latin typeface="Century Gothic"/>
+                <a:cs typeface="Century Gothic"/>
+              </a:rPr>
+              <a:t>tarsalis</a:t>
+            </a:r>
+            <a:endParaRPr lang="en-US" sz="5400" b="1" dirty="0" smtClean="0">
               <a:solidFill>
                 <a:schemeClr val="bg1"/>
               </a:solidFill>
-              <a:latin typeface="Calibri" pitchFamily="34" charset="0"/>
+              <a:latin typeface="Century Gothic"/>
+              <a:cs typeface="Century Gothic"/>
             </a:endParaRPr>
           </a:p>
         </p:txBody>
@@ -2526,7 +2987,7 @@
         </p:nvSpPr>
         <p:spPr>
           <a:xfrm>
-            <a:off x="22275556" y="7162542"/>
+            <a:off x="22254082" y="7224840"/>
             <a:ext cx="10058400" cy="6644640"/>
           </a:xfrm>
           <a:prstGeom prst="rect">
@@ -2560,102 +3021,9 @@
           <a:lstStyle/>
           <a:p>
             <a:pPr marL="3200400"/>
-            <a:r>
-              <a:rPr lang="en-US" sz="2600" dirty="0" smtClean="0">
-                <a:latin typeface="Arial"/>
-                <a:cs typeface="Arial"/>
-              </a:rPr>
-              <a:t>This is where I would have species Richness by average two week max temperature. </a:t>
-            </a:r>
-          </a:p>
-          <a:p>
-            <a:pPr marL="3200400"/>
-            <a:endParaRPr lang="en-US" sz="2600" dirty="0">
-              <a:latin typeface="Arial"/>
-              <a:cs typeface="Arial"/>
-            </a:endParaRPr>
-          </a:p>
-          <a:p>
-            <a:pPr marL="3200400"/>
-            <a:r>
-              <a:rPr lang="en-US" sz="2600" dirty="0" smtClean="0">
-                <a:latin typeface="Arial"/>
-                <a:cs typeface="Arial"/>
-              </a:rPr>
-              <a:t>This </a:t>
-            </a:r>
-            <a:r>
-              <a:rPr lang="en-US" sz="2600" dirty="0" smtClean="0">
-                <a:latin typeface="Arial"/>
-                <a:cs typeface="Arial"/>
-              </a:rPr>
-              <a:t>set up could work well for an image and then text next to it. The three text boxes here have the same header color because they all go together. If I wanted the text to extend back out below the image on the left, I just change the margin again for that paragraph.</a:t>
-            </a:r>
-          </a:p>
-          <a:p>
             <a:endParaRPr lang="en-US" sz="2600" dirty="0" smtClean="0">
               <a:latin typeface="Arial"/>
               <a:cs typeface="Arial"/>
-            </a:endParaRPr>
-          </a:p>
-          <a:p>
-            <a:r>
-              <a:rPr lang="en-US" sz="2600" dirty="0" smtClean="0">
-                <a:latin typeface="Arial"/>
-                <a:cs typeface="Arial"/>
-              </a:rPr>
-              <a:t>These data should extend back for decades or even centuries if possible because the legacies of past land use can have long-term effects on ecosystem performance. </a:t>
-            </a:r>
-          </a:p>
-        </p:txBody>
-      </p:sp>
-      <p:sp>
-        <p:nvSpPr>
-          <p:cNvPr id="60" name="Rectangle 59"/>
-          <p:cNvSpPr/>
-          <p:nvPr/>
-        </p:nvSpPr>
-        <p:spPr>
-          <a:xfrm>
-            <a:off x="22694657" y="7915281"/>
-            <a:ext cx="2905759" cy="4114800"/>
-          </a:xfrm>
-          <a:prstGeom prst="rect">
-            <a:avLst/>
-          </a:prstGeom>
-          <a:solidFill>
-            <a:schemeClr val="bg2"/>
-          </a:solidFill>
-          <a:ln>
-            <a:noFill/>
-          </a:ln>
-        </p:spPr>
-        <p:style>
-          <a:lnRef idx="1">
-            <a:schemeClr val="accent2"/>
-          </a:lnRef>
-          <a:fillRef idx="2">
-            <a:schemeClr val="accent2"/>
-          </a:fillRef>
-          <a:effectRef idx="1">
-            <a:schemeClr val="accent2"/>
-          </a:effectRef>
-          <a:fontRef idx="minor">
-            <a:schemeClr val="dk1"/>
-          </a:fontRef>
-        </p:style>
-        <p:txBody>
-          <a:bodyPr wrap="square" rtlCol="0" anchor="ctr">
-            <a:spAutoFit/>
-          </a:bodyPr>
-          <a:lstStyle/>
-          <a:p>
-            <a:pPr algn="ctr"/>
-            <a:endParaRPr lang="en-US" sz="3600" b="1" baseline="0" dirty="0" smtClean="0">
-              <a:solidFill>
-                <a:schemeClr val="bg1"/>
-              </a:solidFill>
-              <a:latin typeface="Calibri" pitchFamily="34" charset="0"/>
             </a:endParaRPr>
           </a:p>
         </p:txBody>
@@ -2670,8 +3038,8 @@
         </p:nvSpPr>
         <p:spPr>
           <a:xfrm>
-            <a:off x="32895737" y="7264349"/>
-            <a:ext cx="10058400" cy="6644641"/>
+            <a:off x="32943557" y="15043568"/>
+            <a:ext cx="10087082" cy="6653720"/>
           </a:xfrm>
           <a:prstGeom prst="rect">
             <a:avLst/>
@@ -2713,246 +3081,6 @@
       </p:sp>
       <p:sp>
         <p:nvSpPr>
-          <p:cNvPr id="62" name="Rectangle 61"/>
-          <p:cNvSpPr/>
-          <p:nvPr/>
-        </p:nvSpPr>
-        <p:spPr>
-          <a:xfrm>
-            <a:off x="33362964" y="7915281"/>
-            <a:ext cx="9276952" cy="4114800"/>
-          </a:xfrm>
-          <a:prstGeom prst="rect">
-            <a:avLst/>
-          </a:prstGeom>
-          <a:solidFill>
-            <a:schemeClr val="bg2"/>
-          </a:solidFill>
-          <a:ln>
-            <a:noFill/>
-          </a:ln>
-        </p:spPr>
-        <p:style>
-          <a:lnRef idx="1">
-            <a:schemeClr val="accent2"/>
-          </a:lnRef>
-          <a:fillRef idx="2">
-            <a:schemeClr val="accent2"/>
-          </a:fillRef>
-          <a:effectRef idx="1">
-            <a:schemeClr val="accent2"/>
-          </a:effectRef>
-          <a:fontRef idx="minor">
-            <a:schemeClr val="dk1"/>
-          </a:fontRef>
-        </p:style>
-        <p:txBody>
-          <a:bodyPr wrap="square" rtlCol="0" anchor="ctr">
-            <a:spAutoFit/>
-          </a:bodyPr>
-          <a:lstStyle/>
-          <a:p>
-            <a:pPr algn="ctr"/>
-            <a:endParaRPr lang="en-US" sz="3600" b="1" baseline="0" dirty="0" smtClean="0">
-              <a:solidFill>
-                <a:schemeClr val="bg1"/>
-              </a:solidFill>
-              <a:latin typeface="Calibri" pitchFamily="34" charset="0"/>
-            </a:endParaRPr>
-          </a:p>
-        </p:txBody>
-      </p:sp>
-      <p:sp>
-        <p:nvSpPr>
-          <p:cNvPr id="63" name="TextBox 62"/>
-          <p:cNvSpPr txBox="1"/>
-          <p:nvPr/>
-        </p:nvSpPr>
-        <p:spPr>
-          <a:xfrm>
-            <a:off x="25435051" y="17140956"/>
-            <a:ext cx="6472696" cy="6878806"/>
-          </a:xfrm>
-          <a:prstGeom prst="rect">
-            <a:avLst/>
-          </a:prstGeom>
-          <a:noFill/>
-        </p:spPr>
-        <p:txBody>
-          <a:bodyPr wrap="square" rtlCol="0">
-            <a:spAutoFit/>
-          </a:bodyPr>
-          <a:lstStyle/>
-          <a:p>
-            <a:r>
-              <a:rPr lang="en-US" sz="4800" b="1" dirty="0" smtClean="0">
-                <a:solidFill>
-                  <a:schemeClr val="accent2"/>
-                </a:solidFill>
-                <a:latin typeface="Arial"/>
-                <a:cs typeface="Arial"/>
-              </a:rPr>
-              <a:t>That cool NEON map of </a:t>
-            </a:r>
-            <a:r>
-              <a:rPr lang="en-US" sz="4800" b="1" dirty="0" err="1" smtClean="0">
-                <a:solidFill>
-                  <a:schemeClr val="accent2"/>
-                </a:solidFill>
-                <a:latin typeface="Arial"/>
-                <a:cs typeface="Arial"/>
-              </a:rPr>
-              <a:t>Culex</a:t>
-            </a:r>
-            <a:r>
-              <a:rPr lang="en-US" sz="4800" b="1" dirty="0" smtClean="0">
-                <a:solidFill>
-                  <a:schemeClr val="accent2"/>
-                </a:solidFill>
-                <a:latin typeface="Arial"/>
-                <a:cs typeface="Arial"/>
-              </a:rPr>
-              <a:t> </a:t>
-            </a:r>
-            <a:r>
-              <a:rPr lang="en-US" sz="4800" b="1" dirty="0" err="1" smtClean="0">
-                <a:solidFill>
-                  <a:schemeClr val="accent2"/>
-                </a:solidFill>
-                <a:latin typeface="Arial"/>
-                <a:cs typeface="Arial"/>
-              </a:rPr>
-              <a:t>Tarsalis</a:t>
-            </a:r>
-            <a:r>
-              <a:rPr lang="en-US" sz="4800" b="1" dirty="0" smtClean="0">
-                <a:solidFill>
-                  <a:schemeClr val="accent2"/>
-                </a:solidFill>
-                <a:latin typeface="Arial"/>
-                <a:cs typeface="Arial"/>
-              </a:rPr>
-              <a:t> goes here:</a:t>
-            </a:r>
-            <a:endParaRPr lang="en-US" sz="4800" b="1" dirty="0" smtClean="0">
-              <a:solidFill>
-                <a:schemeClr val="accent2"/>
-              </a:solidFill>
-              <a:latin typeface="Arial"/>
-              <a:cs typeface="Arial"/>
-            </a:endParaRPr>
-          </a:p>
-          <a:p>
-            <a:pPr marL="863600" indent="-863600">
-              <a:spcBef>
-                <a:spcPts val="3000"/>
-              </a:spcBef>
-              <a:buFont typeface="Arial"/>
-              <a:buChar char="•"/>
-            </a:pPr>
-            <a:r>
-              <a:rPr lang="en-US" sz="5400" dirty="0" smtClean="0">
-                <a:latin typeface="Arial"/>
-                <a:cs typeface="Arial"/>
-              </a:rPr>
-              <a:t>Bullet 1</a:t>
-            </a:r>
-          </a:p>
-          <a:p>
-            <a:pPr marL="863600" indent="-863600">
-              <a:spcBef>
-                <a:spcPts val="3000"/>
-              </a:spcBef>
-              <a:buFont typeface="Arial"/>
-              <a:buChar char="•"/>
-            </a:pPr>
-            <a:r>
-              <a:rPr lang="en-US" sz="5400" dirty="0" smtClean="0">
-                <a:latin typeface="Arial"/>
-                <a:cs typeface="Arial"/>
-              </a:rPr>
-              <a:t>Bullet 2</a:t>
-            </a:r>
-          </a:p>
-          <a:p>
-            <a:pPr marL="863600" indent="-863600">
-              <a:spcBef>
-                <a:spcPts val="3000"/>
-              </a:spcBef>
-              <a:buFont typeface="Arial"/>
-              <a:buChar char="•"/>
-            </a:pPr>
-            <a:r>
-              <a:rPr lang="en-US" sz="5400" dirty="0" smtClean="0">
-                <a:latin typeface="Arial"/>
-                <a:cs typeface="Arial"/>
-              </a:rPr>
-              <a:t>Bullet 3</a:t>
-            </a:r>
-          </a:p>
-          <a:p>
-            <a:endParaRPr lang="en-US" sz="6000" dirty="0" smtClean="0">
-              <a:latin typeface="Arial"/>
-              <a:cs typeface="Arial"/>
-            </a:endParaRPr>
-          </a:p>
-        </p:txBody>
-      </p:sp>
-      <p:sp>
-        <p:nvSpPr>
-          <p:cNvPr id="64" name="Rectangle 63"/>
-          <p:cNvSpPr/>
-          <p:nvPr/>
-        </p:nvSpPr>
-        <p:spPr>
-          <a:xfrm>
-            <a:off x="12034665" y="16977281"/>
-            <a:ext cx="12973278" cy="10972800"/>
-          </a:xfrm>
-          <a:prstGeom prst="rect">
-            <a:avLst/>
-          </a:prstGeom>
-          <a:solidFill>
-            <a:schemeClr val="bg2"/>
-          </a:solidFill>
-          <a:ln>
-            <a:solidFill>
-              <a:srgbClr val="424242"/>
-            </a:solidFill>
-          </a:ln>
-        </p:spPr>
-        <p:style>
-          <a:lnRef idx="1">
-            <a:schemeClr val="accent4"/>
-          </a:lnRef>
-          <a:fillRef idx="2">
-            <a:schemeClr val="accent4"/>
-          </a:fillRef>
-          <a:effectRef idx="1">
-            <a:schemeClr val="accent4"/>
-          </a:effectRef>
-          <a:fontRef idx="minor">
-            <a:schemeClr val="dk1"/>
-          </a:fontRef>
-        </p:style>
-        <p:txBody>
-          <a:bodyPr wrap="square" rtlCol="0" anchor="ctr">
-            <a:spAutoFit/>
-          </a:bodyPr>
-          <a:lstStyle/>
-          <a:p>
-            <a:pPr algn="ctr"/>
-            <a:endParaRPr lang="en-US" sz="3600" b="1" baseline="0" dirty="0" smtClean="0">
-              <a:solidFill>
-                <a:schemeClr val="bg1"/>
-              </a:solidFill>
-              <a:latin typeface="Calibri" pitchFamily="34" charset="0"/>
-            </a:endParaRPr>
-          </a:p>
-        </p:txBody>
-      </p:sp>
-      <p:sp>
-        <p:nvSpPr>
           <p:cNvPr id="29" name="Title 3"/>
           <p:cNvSpPr>
             <a:spLocks noGrp="1"/>
@@ -2987,7 +3115,7 @@
         </p:nvSpPr>
         <p:spPr>
           <a:xfrm>
-            <a:off x="32972240" y="14790299"/>
+            <a:off x="32996148" y="25084637"/>
             <a:ext cx="10058400" cy="861774"/>
           </a:xfrm>
           <a:prstGeom prst="rect">
@@ -3033,13 +3161,6 @@
               </a:rPr>
               <a:t>References</a:t>
             </a:r>
-            <a:endParaRPr lang="en-US" sz="3200" b="1" dirty="0" smtClean="0">
-              <a:solidFill>
-                <a:schemeClr val="bg1"/>
-              </a:solidFill>
-              <a:latin typeface="Century Gothic"/>
-              <a:cs typeface="Century Gothic"/>
-            </a:endParaRPr>
           </a:p>
         </p:txBody>
       </p:sp>
@@ -3053,8 +3174,8 @@
         </p:nvSpPr>
         <p:spPr>
           <a:xfrm>
-            <a:off x="32972240" y="15676616"/>
-            <a:ext cx="10058400" cy="6644640"/>
+            <a:off x="32996148" y="25946411"/>
+            <a:ext cx="10058400" cy="3591650"/>
           </a:xfrm>
           <a:prstGeom prst="rect">
             <a:avLst/>
@@ -3086,13 +3207,378 @@
           </a:bodyPr>
           <a:lstStyle/>
           <a:p>
-            <a:r>
-              <a:rPr lang="en-US" sz="2600" dirty="0" smtClean="0">
+            <a:pPr marL="342900" indent="-342900">
+              <a:buAutoNum type="arabicParenR"/>
+            </a:pPr>
+            <a:r>
+              <a:rPr lang="en-US" sz="1700" dirty="0" err="1" smtClean="0"/>
+              <a:t>Hoekman</a:t>
+            </a:r>
+            <a:r>
+              <a:rPr lang="en-US" sz="1700" dirty="0"/>
+              <a:t>, D., Y. P. Springer, C. M. Barker, R. Barrera, M. S. Blackmore, W. E. Bradshaw, D. H. Foley, H. S. Ginsberg, M. H. Hayden, C. M. </a:t>
+            </a:r>
+            <a:r>
+              <a:rPr lang="en-US" sz="1700" dirty="0" err="1"/>
+              <a:t>Holzapfel</a:t>
+            </a:r>
+            <a:r>
+              <a:rPr lang="en-US" sz="1700" dirty="0"/>
+              <a:t>, S. A. </a:t>
+            </a:r>
+            <a:r>
+              <a:rPr lang="en-US" sz="1700" dirty="0" err="1"/>
+              <a:t>Juliano</a:t>
+            </a:r>
+            <a:r>
+              <a:rPr lang="en-US" sz="1700" dirty="0"/>
+              <a:t>, L. D. Kramer, S. L. </a:t>
+            </a:r>
+            <a:r>
+              <a:rPr lang="en-US" sz="1700" dirty="0" err="1"/>
+              <a:t>LaDeau</a:t>
+            </a:r>
+            <a:r>
+              <a:rPr lang="en-US" sz="1700" dirty="0"/>
+              <a:t>, T. P. </a:t>
+            </a:r>
+            <a:r>
+              <a:rPr lang="en-US" sz="1700" dirty="0" err="1"/>
+              <a:t>Livdahl</a:t>
+            </a:r>
+            <a:r>
+              <a:rPr lang="en-US" sz="1700" dirty="0"/>
+              <a:t>, C. G. Moore, R. S. </a:t>
+            </a:r>
+            <a:r>
+              <a:rPr lang="en-US" sz="1700" dirty="0" err="1"/>
+              <a:t>Nasci</a:t>
+            </a:r>
+            <a:r>
+              <a:rPr lang="en-US" sz="1700" dirty="0"/>
+              <a:t>, W. K. </a:t>
+            </a:r>
+            <a:r>
+              <a:rPr lang="en-US" sz="1700" dirty="0" err="1"/>
+              <a:t>Reisen</a:t>
+            </a:r>
+            <a:r>
+              <a:rPr lang="en-US" sz="1700" dirty="0"/>
+              <a:t>, and H. M. Savage. 2016. Design for mosquito abundance, diversity, and phenology sampling within the National Ecological Observatory Network. Ecosphere 7:1–13</a:t>
+            </a:r>
+            <a:r>
+              <a:rPr lang="en-US" sz="1700" dirty="0" smtClean="0"/>
+              <a:t>.</a:t>
+            </a:r>
+          </a:p>
+          <a:p>
+            <a:pPr marL="342900" indent="-342900">
+              <a:buAutoNum type="arabicParenR"/>
+            </a:pPr>
+            <a:r>
+              <a:rPr lang="en-US" sz="1700" dirty="0" err="1"/>
+              <a:t>Ciota</a:t>
+            </a:r>
+            <a:r>
+              <a:rPr lang="en-US" sz="1700" dirty="0"/>
+              <a:t>, A</a:t>
+            </a:r>
+            <a:r>
+              <a:rPr lang="en-US" sz="1700" dirty="0" smtClean="0"/>
+              <a:t>., </a:t>
+            </a:r>
+            <a:r>
+              <a:rPr lang="en-US" sz="1700" dirty="0"/>
+              <a:t>M. A</a:t>
+            </a:r>
+            <a:r>
+              <a:rPr lang="en-US" sz="1700" dirty="0" smtClean="0"/>
+              <a:t>., K</a:t>
+            </a:r>
+            <a:r>
+              <a:rPr lang="en-US" sz="1700" dirty="0"/>
+              <a:t>. A</a:t>
+            </a:r>
+            <a:r>
+              <a:rPr lang="en-US" sz="1700" dirty="0" smtClean="0"/>
+              <a:t>., K</a:t>
+            </a:r>
+            <a:r>
+              <a:rPr lang="en-US" sz="1700" dirty="0"/>
+              <a:t>. L. 2014. The Effects of Temperature on Life History Traits of </a:t>
+            </a:r>
+            <a:r>
+              <a:rPr lang="en-US" sz="1700" dirty="0" err="1"/>
+              <a:t>Culex</a:t>
+            </a:r>
+            <a:r>
+              <a:rPr lang="en-US" sz="1700" dirty="0"/>
+              <a:t> Mosquitoes</a:t>
+            </a:r>
+            <a:r>
+              <a:rPr lang="en-US" sz="1700" dirty="0" smtClean="0"/>
+              <a:t>.</a:t>
+            </a:r>
+          </a:p>
+          <a:p>
+            <a:pPr marL="342900" indent="-342900">
+              <a:buAutoNum type="arabicParenR"/>
+            </a:pPr>
+            <a:r>
+              <a:rPr lang="en-US" sz="1700" dirty="0"/>
+              <a:t>Bryant, P. J. 2007. Western Encephalitis Mosquito. Natural History of Orange County, California and Nearby Places. University of California, Irvine.</a:t>
+            </a:r>
+          </a:p>
+          <a:p>
+            <a:pPr marL="342900" indent="-342900">
+              <a:buAutoNum type="arabicParenR"/>
+            </a:pPr>
+            <a:r>
+              <a:rPr lang="en-US" sz="1700" dirty="0" err="1"/>
+              <a:t>Darsie</a:t>
+            </a:r>
+            <a:r>
+              <a:rPr lang="en-US" sz="1700" dirty="0"/>
+              <a:t>, R. F., R. A. Ward, C. C. Chang, and T. </a:t>
+            </a:r>
+            <a:r>
+              <a:rPr lang="en-US" sz="1700" dirty="0" err="1"/>
+              <a:t>Litwak</a:t>
+            </a:r>
+            <a:r>
+              <a:rPr lang="en-US" sz="1700" dirty="0"/>
+              <a:t>. 2005. Identification and geographical distribution of the mosquitoes of North America, north of Mexico. University Press of </a:t>
+            </a:r>
+            <a:r>
+              <a:rPr lang="en-US" sz="1700" dirty="0" err="1"/>
+              <a:t>FloridaGainsville</a:t>
+            </a:r>
+            <a:r>
+              <a:rPr lang="en-US" sz="1700" dirty="0"/>
+              <a:t>, FL.</a:t>
+            </a:r>
+            <a:endParaRPr lang="en-US" sz="1700" dirty="0" smtClean="0"/>
+          </a:p>
+          <a:p>
+            <a:pPr marL="342900" indent="-342900">
+              <a:buAutoNum type="arabicParenR"/>
+            </a:pPr>
+            <a:endParaRPr lang="en-US" sz="1600" dirty="0"/>
+          </a:p>
+          <a:p>
+            <a:endParaRPr lang="en-US" sz="1600" dirty="0" smtClean="0">
+              <a:latin typeface="Arial"/>
+              <a:cs typeface="Arial"/>
+            </a:endParaRPr>
+          </a:p>
+        </p:txBody>
+      </p:sp>
+      <p:grpSp>
+        <p:nvGrpSpPr>
+          <p:cNvPr id="73" name="Group 72"/>
+          <p:cNvGrpSpPr/>
+          <p:nvPr/>
+        </p:nvGrpSpPr>
+        <p:grpSpPr>
+          <a:xfrm>
+            <a:off x="32996148" y="22218932"/>
+            <a:ext cx="10058400" cy="2590185"/>
+            <a:chOff x="32972239" y="26402313"/>
+            <a:chExt cx="9981897" cy="2590185"/>
+          </a:xfrm>
+        </p:grpSpPr>
+        <p:sp>
+          <p:nvSpPr>
+            <p:cNvPr id="32" name="TextBox 31"/>
+            <p:cNvSpPr txBox="1"/>
+            <p:nvPr/>
+          </p:nvSpPr>
+          <p:spPr>
+            <a:xfrm>
+              <a:off x="32972239" y="26402313"/>
+              <a:ext cx="9981897" cy="861774"/>
+            </a:xfrm>
+            <a:prstGeom prst="rect">
+              <a:avLst/>
+            </a:prstGeom>
+            <a:solidFill>
+              <a:srgbClr val="424242"/>
+            </a:solidFill>
+            <a:ln>
+              <a:solidFill>
+                <a:srgbClr val="424242"/>
+              </a:solidFill>
+            </a:ln>
+          </p:spPr>
+          <p:style>
+            <a:lnRef idx="0">
+              <a:schemeClr val="accent2"/>
+            </a:lnRef>
+            <a:fillRef idx="3">
+              <a:schemeClr val="accent2"/>
+            </a:fillRef>
+            <a:effectRef idx="3">
+              <a:schemeClr val="accent2"/>
+            </a:effectRef>
+            <a:fontRef idx="minor">
+              <a:schemeClr val="lt1"/>
+            </a:fontRef>
+          </p:style>
+          <p:txBody>
+            <a:bodyPr wrap="square" lIns="182880" tIns="182880" rIns="182880" bIns="182880" rtlCol="0">
+              <a:spAutoFit/>
+            </a:bodyPr>
+            <a:lstStyle/>
+            <a:p>
+              <a:pPr algn="ctr"/>
+              <a:r>
+                <a:rPr lang="en-US" sz="3200" b="1" dirty="0" smtClean="0">
+                  <a:solidFill>
+                    <a:schemeClr val="bg1"/>
+                  </a:solidFill>
+                  <a:latin typeface="Century Gothic"/>
+                  <a:cs typeface="Century Gothic"/>
+                </a:rPr>
+                <a:t>Acknowledgments</a:t>
+              </a:r>
+            </a:p>
+          </p:txBody>
+        </p:sp>
+        <p:sp>
+          <p:nvSpPr>
+            <p:cNvPr id="33" name="Rectangle 32"/>
+            <p:cNvSpPr>
+              <a:spLocks/>
+            </p:cNvSpPr>
+            <p:nvPr/>
+          </p:nvSpPr>
+          <p:spPr>
+            <a:xfrm>
+              <a:off x="32972239" y="27264088"/>
+              <a:ext cx="9981897" cy="1728410"/>
+            </a:xfrm>
+            <a:prstGeom prst="rect">
+              <a:avLst/>
+            </a:prstGeom>
+            <a:ln w="12700">
+              <a:solidFill>
+                <a:srgbClr val="424242"/>
+              </a:solidFill>
+              <a:miter lim="800000"/>
+            </a:ln>
+          </p:spPr>
+          <p:style>
+            <a:lnRef idx="2">
+              <a:schemeClr val="dk1"/>
+            </a:lnRef>
+            <a:fillRef idx="1">
+              <a:schemeClr val="lt1"/>
+            </a:fillRef>
+            <a:effectRef idx="0">
+              <a:schemeClr val="dk1"/>
+            </a:effectRef>
+            <a:fontRef idx="minor">
+              <a:schemeClr val="dk1"/>
+            </a:fontRef>
+          </p:style>
+          <p:txBody>
+            <a:bodyPr wrap="square" lIns="457200" tIns="274320" rIns="457200" bIns="457200">
+              <a:noAutofit/>
+            </a:bodyPr>
+            <a:lstStyle/>
+            <a:p>
+              <a:r>
+                <a:rPr lang="en-US" sz="2600" dirty="0" smtClean="0">
+                  <a:latin typeface="Arial"/>
+                  <a:cs typeface="Arial"/>
+                </a:rPr>
+                <a:t>Special thanks to Cody Flagg, Megan Jones, and Katie LeVan for providing mentorship, coding expertise, and support throughout the creation of this data tutorial. </a:t>
+              </a:r>
+              <a:endParaRPr lang="en-US" sz="2600" dirty="0" smtClean="0">
                 <a:latin typeface="Arial"/>
                 <a:cs typeface="Arial"/>
-              </a:rPr>
-              <a:t>Them references.</a:t>
-            </a:r>
+              </a:endParaRPr>
+            </a:p>
+          </p:txBody>
+        </p:sp>
+      </p:grpSp>
+      <p:pic>
+        <p:nvPicPr>
+          <p:cNvPr id="8" name="Picture 7"/>
+          <p:cNvPicPr>
+            <a:picLocks noChangeAspect="1"/>
+          </p:cNvPicPr>
+          <p:nvPr/>
+        </p:nvPicPr>
+        <p:blipFill>
+          <a:blip r:embed="rId2">
+            <a:extLst>
+              <a:ext uri="{28A0092B-C50C-407E-A947-70E740481C1C}">
+                <a14:useLocalDpi xmlns:a14="http://schemas.microsoft.com/office/drawing/2010/main" val="0"/>
+              </a:ext>
+            </a:extLst>
+          </a:blip>
+          <a:stretch>
+            <a:fillRect/>
+          </a:stretch>
+        </p:blipFill>
+        <p:spPr>
+          <a:xfrm>
+            <a:off x="33372841" y="15397488"/>
+            <a:ext cx="9156918" cy="4851145"/>
+          </a:xfrm>
+          <a:prstGeom prst="rect">
+            <a:avLst/>
+          </a:prstGeom>
+        </p:spPr>
+      </p:pic>
+      <p:sp>
+        <p:nvSpPr>
+          <p:cNvPr id="26" name="Rectangle 25"/>
+          <p:cNvSpPr>
+            <a:spLocks/>
+          </p:cNvSpPr>
+          <p:nvPr/>
+        </p:nvSpPr>
+        <p:spPr>
+          <a:xfrm>
+            <a:off x="32972239" y="7191495"/>
+            <a:ext cx="10058400" cy="6592414"/>
+          </a:xfrm>
+          <a:prstGeom prst="rect">
+            <a:avLst/>
+          </a:prstGeom>
+          <a:ln w="12700">
+            <a:solidFill>
+              <a:srgbClr val="424242"/>
+            </a:solidFill>
+            <a:miter lim="800000"/>
+          </a:ln>
+        </p:spPr>
+        <p:style>
+          <a:lnRef idx="2">
+            <a:schemeClr val="dk1"/>
+          </a:lnRef>
+          <a:fillRef idx="1">
+            <a:schemeClr val="lt1"/>
+          </a:fillRef>
+          <a:effectRef idx="0">
+            <a:schemeClr val="dk1"/>
+          </a:effectRef>
+          <a:fontRef idx="minor">
+            <a:schemeClr val="dk1"/>
+          </a:fontRef>
+        </p:style>
+        <p:txBody>
+          <a:bodyPr wrap="square" lIns="457200" tIns="274320" rIns="457200" bIns="457200">
+            <a:noAutofit/>
+          </a:bodyPr>
+          <a:lstStyle/>
+          <a:p>
+            <a:pPr indent="-457200">
+              <a:buFont typeface="Arial" panose="020B0604020202020204" pitchFamily="34" charset="0"/>
+              <a:buChar char="•"/>
+            </a:pPr>
             <a:endParaRPr lang="en-US" sz="2600" dirty="0" smtClean="0">
               <a:latin typeface="Arial"/>
               <a:cs typeface="Arial"/>
@@ -3102,14 +3588,14 @@
       </p:sp>
       <p:sp>
         <p:nvSpPr>
-          <p:cNvPr id="32" name="TextBox 31"/>
+          <p:cNvPr id="27" name="TextBox 26"/>
           <p:cNvSpPr txBox="1"/>
           <p:nvPr/>
         </p:nvSpPr>
         <p:spPr>
           <a:xfrm>
-            <a:off x="32972239" y="22747134"/>
-            <a:ext cx="9981897" cy="861774"/>
+            <a:off x="32972239" y="6402576"/>
+            <a:ext cx="10058400" cy="800219"/>
           </a:xfrm>
           <a:prstGeom prst="rect">
             <a:avLst/>
@@ -3145,16 +3631,56 @@
           <a:p>
             <a:pPr algn="ctr"/>
             <a:r>
-              <a:rPr lang="en-US" sz="3200" b="1" dirty="0" smtClean="0">
+              <a:rPr lang="en-US" sz="2800" b="1" dirty="0" smtClean="0">
                 <a:solidFill>
                   <a:schemeClr val="bg1"/>
                 </a:solidFill>
                 <a:latin typeface="Century Gothic"/>
                 <a:cs typeface="Century Gothic"/>
               </a:rPr>
-              <a:t>Acknowledgments</a:t>
-            </a:r>
-            <a:endParaRPr lang="en-US" sz="3200" b="1" dirty="0" smtClean="0">
+              <a:t>Vignette Two: Abundance and Range of </a:t>
+            </a:r>
+            <a:r>
+              <a:rPr lang="en-US" sz="2800" b="1" i="1" dirty="0" err="1">
+                <a:solidFill>
+                  <a:schemeClr val="bg1"/>
+                </a:solidFill>
+                <a:latin typeface="Century Gothic"/>
+                <a:cs typeface="Century Gothic"/>
+              </a:rPr>
+              <a:t>C</a:t>
+            </a:r>
+            <a:r>
+              <a:rPr lang="en-US" sz="2800" b="1" i="1" dirty="0" err="1" smtClean="0">
+                <a:solidFill>
+                  <a:schemeClr val="bg1"/>
+                </a:solidFill>
+                <a:latin typeface="Century Gothic"/>
+                <a:cs typeface="Century Gothic"/>
+              </a:rPr>
+              <a:t>ulex</a:t>
+            </a:r>
+            <a:r>
+              <a:rPr lang="en-US" sz="2800" b="1" i="1" dirty="0" smtClean="0">
+                <a:solidFill>
+                  <a:schemeClr val="bg1"/>
+                </a:solidFill>
+                <a:latin typeface="Century Gothic"/>
+                <a:cs typeface="Century Gothic"/>
+              </a:rPr>
+              <a:t> </a:t>
+            </a:r>
+            <a:r>
+              <a:rPr lang="en-US" sz="2800" b="1" i="1" dirty="0" err="1" smtClean="0">
+                <a:solidFill>
+                  <a:schemeClr val="bg1"/>
+                </a:solidFill>
+                <a:latin typeface="Century Gothic"/>
+                <a:cs typeface="Century Gothic"/>
+              </a:rPr>
+              <a:t>tarsalis</a:t>
+            </a:r>
+            <a:endParaRPr lang="en-US" sz="2800" b="1" i="1" dirty="0" smtClean="0">
               <a:solidFill>
                 <a:schemeClr val="bg1"/>
               </a:solidFill>
@@ -3164,114 +3690,1134 @@
           </a:p>
         </p:txBody>
       </p:sp>
+      <p:pic>
+        <p:nvPicPr>
+          <p:cNvPr id="11" name="Picture 10"/>
+          <p:cNvPicPr>
+            <a:picLocks noChangeAspect="1"/>
+          </p:cNvPicPr>
+          <p:nvPr/>
+        </p:nvPicPr>
+        <p:blipFill>
+          <a:blip r:embed="rId3">
+            <a:extLst>
+              <a:ext uri="{28A0092B-C50C-407E-A947-70E740481C1C}">
+                <a14:useLocalDpi xmlns:a14="http://schemas.microsoft.com/office/drawing/2010/main" val="0"/>
+              </a:ext>
+            </a:extLst>
+          </a:blip>
+          <a:stretch>
+            <a:fillRect/>
+          </a:stretch>
+        </p:blipFill>
+        <p:spPr>
+          <a:xfrm>
+            <a:off x="11841894" y="15765567"/>
+            <a:ext cx="12332556" cy="6689381"/>
+          </a:xfrm>
+          <a:prstGeom prst="rect">
+            <a:avLst/>
+          </a:prstGeom>
+        </p:spPr>
+      </p:pic>
+      <p:pic>
+        <p:nvPicPr>
+          <p:cNvPr id="12" name="Picture 11"/>
+          <p:cNvPicPr>
+            <a:picLocks noChangeAspect="1"/>
+          </p:cNvPicPr>
+          <p:nvPr/>
+        </p:nvPicPr>
+        <p:blipFill>
+          <a:blip r:embed="rId4" cstate="print">
+            <a:extLst>
+              <a:ext uri="{28A0092B-C50C-407E-A947-70E740481C1C}">
+                <a14:useLocalDpi xmlns:a14="http://schemas.microsoft.com/office/drawing/2010/main" val="0"/>
+              </a:ext>
+            </a:extLst>
+          </a:blip>
+          <a:stretch>
+            <a:fillRect/>
+          </a:stretch>
+        </p:blipFill>
+        <p:spPr>
+          <a:xfrm>
+            <a:off x="1496482" y="28427970"/>
+            <a:ext cx="1026224" cy="1026224"/>
+          </a:xfrm>
+          <a:prstGeom prst="rect">
+            <a:avLst/>
+          </a:prstGeom>
+        </p:spPr>
+      </p:pic>
       <p:sp>
         <p:nvSpPr>
-          <p:cNvPr id="33" name="Rectangle 32"/>
-          <p:cNvSpPr>
-            <a:spLocks/>
-          </p:cNvSpPr>
+          <p:cNvPr id="13" name="TextBox 12"/>
+          <p:cNvSpPr txBox="1"/>
           <p:nvPr/>
         </p:nvSpPr>
         <p:spPr>
           <a:xfrm>
-            <a:off x="32972239" y="23633452"/>
-            <a:ext cx="9981897" cy="5633484"/>
+            <a:off x="2682620" y="28525583"/>
+            <a:ext cx="8155421" cy="830997"/>
           </a:xfrm>
           <a:prstGeom prst="rect">
             <a:avLst/>
           </a:prstGeom>
-          <a:ln w="12700">
-            <a:solidFill>
-              <a:srgbClr val="424242"/>
-            </a:solidFill>
-            <a:miter lim="800000"/>
-          </a:ln>
+          <a:noFill/>
         </p:spPr>
-        <p:style>
-          <a:lnRef idx="2">
-            <a:schemeClr val="dk1"/>
-          </a:lnRef>
-          <a:fillRef idx="1">
-            <a:schemeClr val="lt1"/>
-          </a:fillRef>
-          <a:effectRef idx="0">
-            <a:schemeClr val="dk1"/>
-          </a:effectRef>
-          <a:fontRef idx="minor">
-            <a:schemeClr val="dk1"/>
-          </a:fontRef>
-        </p:style>
         <p:txBody>
-          <a:bodyPr wrap="square" lIns="457200" tIns="274320" rIns="457200" bIns="457200">
-            <a:noAutofit/>
+          <a:bodyPr wrap="square" rtlCol="0">
+            <a:spAutoFit/>
           </a:bodyPr>
           <a:lstStyle/>
           <a:p>
             <a:r>
-              <a:rPr lang="en-US" sz="2600" dirty="0" smtClean="0">
-                <a:latin typeface="Arial"/>
-                <a:cs typeface="Arial"/>
-              </a:rPr>
-              <a:t>Acknowledge.</a:t>
-            </a:r>
-            <a:endParaRPr lang="en-US" sz="2600" dirty="0" smtClean="0">
-              <a:latin typeface="Arial"/>
-              <a:cs typeface="Arial"/>
+              <a:rPr lang="en-US" sz="2400" dirty="0" smtClean="0">
+                <a:solidFill>
+                  <a:schemeClr val="bg1">
+                    <a:lumMod val="65000"/>
+                  </a:schemeClr>
+                </a:solidFill>
+              </a:rPr>
+              <a:t>For more information on project methods, access to code, and NEON mosquito data, please scan this QR code. </a:t>
+            </a:r>
+            <a:endParaRPr lang="en-US" sz="2400" dirty="0">
+              <a:solidFill>
+                <a:schemeClr val="bg1">
+                  <a:lumMod val="65000"/>
+                </a:schemeClr>
+              </a:solidFill>
             </a:endParaRPr>
+          </a:p>
+        </p:txBody>
+      </p:sp>
+      <p:pic>
+        <p:nvPicPr>
+          <p:cNvPr id="14" name="Picture 13"/>
+          <p:cNvPicPr>
+            <a:picLocks noChangeAspect="1"/>
+          </p:cNvPicPr>
+          <p:nvPr/>
+        </p:nvPicPr>
+        <p:blipFill>
+          <a:blip r:embed="rId5">
+            <a:extLst>
+              <a:ext uri="{28A0092B-C50C-407E-A947-70E740481C1C}">
+                <a14:useLocalDpi xmlns:a14="http://schemas.microsoft.com/office/drawing/2010/main" val="0"/>
+              </a:ext>
+            </a:extLst>
+          </a:blip>
+          <a:stretch>
+            <a:fillRect/>
+          </a:stretch>
+        </p:blipFill>
+        <p:spPr>
+          <a:xfrm>
+            <a:off x="12077776" y="7711925"/>
+            <a:ext cx="9017240" cy="4964454"/>
+          </a:xfrm>
+          <a:prstGeom prst="rect">
+            <a:avLst/>
+          </a:prstGeom>
+        </p:spPr>
+      </p:pic>
+      <p:sp>
+        <p:nvSpPr>
+          <p:cNvPr id="15" name="TextBox 14"/>
+          <p:cNvSpPr txBox="1"/>
+          <p:nvPr/>
+        </p:nvSpPr>
+        <p:spPr>
+          <a:xfrm>
+            <a:off x="12077776" y="12857852"/>
+            <a:ext cx="8928423" cy="492443"/>
+          </a:xfrm>
+          <a:prstGeom prst="rect">
+            <a:avLst/>
+          </a:prstGeom>
+          <a:noFill/>
+        </p:spPr>
+        <p:txBody>
+          <a:bodyPr wrap="square" rtlCol="0">
+            <a:spAutoFit/>
+          </a:bodyPr>
+          <a:lstStyle/>
+          <a:p>
+            <a:r>
+              <a:rPr lang="en-US" sz="2600" b="1" dirty="0" smtClean="0"/>
+              <a:t>Figure 1. </a:t>
+            </a:r>
+            <a:r>
+              <a:rPr lang="en-US" sz="2600" i="1" dirty="0" smtClean="0"/>
+              <a:t>Scatterplot of Species Richness by Latitude </a:t>
+            </a:r>
+            <a:endParaRPr lang="en-US" sz="2600" i="1" dirty="0"/>
+          </a:p>
+        </p:txBody>
+      </p:sp>
+      <p:pic>
+        <p:nvPicPr>
+          <p:cNvPr id="16" name="Picture 15"/>
+          <p:cNvPicPr>
+            <a:picLocks noChangeAspect="1"/>
+          </p:cNvPicPr>
+          <p:nvPr/>
+        </p:nvPicPr>
+        <p:blipFill>
+          <a:blip r:embed="rId6">
+            <a:extLst>
+              <a:ext uri="{28A0092B-C50C-407E-A947-70E740481C1C}">
+                <a14:useLocalDpi xmlns:a14="http://schemas.microsoft.com/office/drawing/2010/main" val="0"/>
+              </a:ext>
+            </a:extLst>
+          </a:blip>
+          <a:stretch>
+            <a:fillRect/>
+          </a:stretch>
+        </p:blipFill>
+        <p:spPr>
+          <a:xfrm>
+            <a:off x="22908405" y="7672502"/>
+            <a:ext cx="8830756" cy="4964454"/>
+          </a:xfrm>
+          <a:prstGeom prst="rect">
+            <a:avLst/>
+          </a:prstGeom>
+        </p:spPr>
+      </p:pic>
+      <p:sp>
+        <p:nvSpPr>
+          <p:cNvPr id="38" name="TextBox 37"/>
+          <p:cNvSpPr txBox="1"/>
+          <p:nvPr/>
+        </p:nvSpPr>
+        <p:spPr>
+          <a:xfrm>
+            <a:off x="22908126" y="12857852"/>
+            <a:ext cx="8928423" cy="892552"/>
+          </a:xfrm>
+          <a:prstGeom prst="rect">
+            <a:avLst/>
+          </a:prstGeom>
+          <a:noFill/>
+        </p:spPr>
+        <p:txBody>
+          <a:bodyPr wrap="square" rtlCol="0">
+            <a:spAutoFit/>
+          </a:bodyPr>
+          <a:lstStyle/>
+          <a:p>
+            <a:r>
+              <a:rPr lang="en-US" sz="2600" b="1" dirty="0" smtClean="0"/>
+              <a:t>Figure 2. </a:t>
+            </a:r>
+            <a:r>
+              <a:rPr lang="en-US" sz="2600" i="1" dirty="0" smtClean="0"/>
+              <a:t>Scatterplot of Species Richness by two week </a:t>
+            </a:r>
+            <a:r>
+              <a:rPr lang="en-US" sz="2600" i="1" dirty="0"/>
+              <a:t>a</a:t>
+            </a:r>
+            <a:r>
+              <a:rPr lang="en-US" sz="2600" i="1" dirty="0" smtClean="0"/>
+              <a:t>verage </a:t>
+            </a:r>
+            <a:r>
+              <a:rPr lang="en-US" sz="2600" i="1" dirty="0"/>
+              <a:t>m</a:t>
+            </a:r>
+            <a:r>
+              <a:rPr lang="en-US" sz="2600" i="1" dirty="0" smtClean="0"/>
+              <a:t>aximum </a:t>
+            </a:r>
+            <a:r>
+              <a:rPr lang="en-US" sz="2600" i="1" dirty="0"/>
+              <a:t>t</a:t>
+            </a:r>
+            <a:r>
+              <a:rPr lang="en-US" sz="2600" i="1" dirty="0" smtClean="0"/>
+              <a:t>emperature in degrees Celsius</a:t>
+            </a:r>
+            <a:endParaRPr lang="en-US" sz="2600" i="1" dirty="0"/>
+          </a:p>
+        </p:txBody>
+      </p:sp>
+      <p:pic>
+        <p:nvPicPr>
+          <p:cNvPr id="17" name="Picture 16"/>
+          <p:cNvPicPr>
+            <a:picLocks noChangeAspect="1"/>
+          </p:cNvPicPr>
+          <p:nvPr/>
+        </p:nvPicPr>
+        <p:blipFill>
+          <a:blip r:embed="rId7">
+            <a:extLst>
+              <a:ext uri="{28A0092B-C50C-407E-A947-70E740481C1C}">
+                <a14:useLocalDpi xmlns:a14="http://schemas.microsoft.com/office/drawing/2010/main" val="0"/>
+              </a:ext>
+            </a:extLst>
+          </a:blip>
+          <a:stretch>
+            <a:fillRect/>
+          </a:stretch>
+        </p:blipFill>
+        <p:spPr>
+          <a:xfrm>
+            <a:off x="34190975" y="7711925"/>
+            <a:ext cx="7592245" cy="4963961"/>
+          </a:xfrm>
+          <a:prstGeom prst="rect">
+            <a:avLst/>
+          </a:prstGeom>
+        </p:spPr>
+      </p:pic>
+      <p:sp>
+        <p:nvSpPr>
+          <p:cNvPr id="40" name="TextBox 39"/>
+          <p:cNvSpPr txBox="1"/>
+          <p:nvPr/>
+        </p:nvSpPr>
+        <p:spPr>
+          <a:xfrm>
+            <a:off x="33372842" y="12857852"/>
+            <a:ext cx="8928423" cy="492443"/>
+          </a:xfrm>
+          <a:prstGeom prst="rect">
+            <a:avLst/>
+          </a:prstGeom>
+          <a:noFill/>
+        </p:spPr>
+        <p:txBody>
+          <a:bodyPr wrap="square" rtlCol="0">
+            <a:spAutoFit/>
+          </a:bodyPr>
+          <a:lstStyle/>
+          <a:p>
+            <a:r>
+              <a:rPr lang="en-US" sz="2600" b="1" dirty="0" smtClean="0"/>
+              <a:t>Figure 3. </a:t>
+            </a:r>
+            <a:r>
+              <a:rPr lang="en-US" sz="2600" i="1" dirty="0" smtClean="0"/>
+              <a:t>Picture of a female </a:t>
+            </a:r>
+            <a:r>
+              <a:rPr lang="en-US" sz="2600" i="1" dirty="0" err="1" smtClean="0"/>
+              <a:t>Culex</a:t>
+            </a:r>
+            <a:r>
+              <a:rPr lang="en-US" sz="2600" i="1" dirty="0" smtClean="0"/>
+              <a:t> tarsalis</a:t>
+            </a:r>
+            <a:r>
+              <a:rPr lang="en-US" sz="2600" i="1" baseline="30000" dirty="0" smtClean="0"/>
+              <a:t>3</a:t>
+            </a:r>
+            <a:r>
+              <a:rPr lang="en-US" sz="2600" i="1" dirty="0" smtClean="0"/>
+              <a:t>  </a:t>
+            </a:r>
+            <a:endParaRPr lang="en-US" sz="2600" i="1" dirty="0"/>
           </a:p>
         </p:txBody>
       </p:sp>
       <p:sp>
         <p:nvSpPr>
-          <p:cNvPr id="35" name="Rectangle 34"/>
+          <p:cNvPr id="41" name="TextBox 40"/>
+          <p:cNvSpPr txBox="1"/>
+          <p:nvPr/>
+        </p:nvSpPr>
+        <p:spPr>
+          <a:xfrm>
+            <a:off x="33372842" y="20310459"/>
+            <a:ext cx="9156918" cy="1292662"/>
+          </a:xfrm>
+          <a:prstGeom prst="rect">
+            <a:avLst/>
+          </a:prstGeom>
+          <a:noFill/>
+        </p:spPr>
+        <p:txBody>
+          <a:bodyPr wrap="square" rtlCol="0">
+            <a:spAutoFit/>
+          </a:bodyPr>
+          <a:lstStyle/>
+          <a:p>
+            <a:r>
+              <a:rPr lang="en-US" sz="2600" b="1" dirty="0" smtClean="0"/>
+              <a:t>Figure 4. </a:t>
+            </a:r>
+            <a:r>
+              <a:rPr lang="en-US" sz="2600" i="1" dirty="0" smtClean="0"/>
+              <a:t>Scatter plot of two week average maximum temperature by date for 2016(top). Scatter plot of </a:t>
+            </a:r>
+            <a:r>
+              <a:rPr lang="en-US" sz="2600" i="1" dirty="0" err="1" smtClean="0"/>
+              <a:t>Culex</a:t>
+            </a:r>
+            <a:r>
+              <a:rPr lang="en-US" sz="2600" i="1" dirty="0" smtClean="0"/>
+              <a:t> </a:t>
+            </a:r>
+            <a:r>
+              <a:rPr lang="en-US" sz="2600" i="1" dirty="0" err="1" smtClean="0"/>
+              <a:t>tarsalis</a:t>
+            </a:r>
+            <a:r>
+              <a:rPr lang="en-US" sz="2600" i="1" dirty="0" smtClean="0"/>
+              <a:t> abundance by date for 2016 (bottom).</a:t>
+            </a:r>
+            <a:endParaRPr lang="en-US" sz="2600" i="1" dirty="0"/>
+          </a:p>
+        </p:txBody>
+      </p:sp>
+      <p:sp>
+        <p:nvSpPr>
+          <p:cNvPr id="21" name="TextBox 20"/>
+          <p:cNvSpPr txBox="1"/>
+          <p:nvPr/>
+        </p:nvSpPr>
+        <p:spPr>
+          <a:xfrm>
+            <a:off x="24604915" y="15792382"/>
+            <a:ext cx="3315514" cy="523220"/>
+          </a:xfrm>
+          <a:prstGeom prst="rect">
+            <a:avLst/>
+          </a:prstGeom>
+          <a:noFill/>
+        </p:spPr>
+        <p:txBody>
+          <a:bodyPr wrap="square" rtlCol="0">
+            <a:spAutoFit/>
+          </a:bodyPr>
+          <a:lstStyle/>
+          <a:p>
+            <a:r>
+              <a:rPr lang="en-US" sz="2800" b="1" dirty="0" smtClean="0"/>
+              <a:t>Native Status </a:t>
+            </a:r>
+            <a:endParaRPr lang="en-US" sz="2800" b="1" dirty="0"/>
+          </a:p>
+        </p:txBody>
+      </p:sp>
+      <p:grpSp>
+        <p:nvGrpSpPr>
+          <p:cNvPr id="25" name="Group 24"/>
+          <p:cNvGrpSpPr/>
+          <p:nvPr/>
+        </p:nvGrpSpPr>
+        <p:grpSpPr>
+          <a:xfrm>
+            <a:off x="24603734" y="16529197"/>
+            <a:ext cx="2042550" cy="984886"/>
+            <a:chOff x="25522800" y="24749493"/>
+            <a:chExt cx="2042550" cy="984886"/>
+          </a:xfrm>
+        </p:grpSpPr>
+        <p:sp>
+          <p:nvSpPr>
+            <p:cNvPr id="18" name="Rectangle 17"/>
+            <p:cNvSpPr/>
+            <p:nvPr/>
+          </p:nvSpPr>
+          <p:spPr>
+            <a:xfrm>
+              <a:off x="25522800" y="24826380"/>
+              <a:ext cx="639723" cy="338670"/>
+            </a:xfrm>
+            <a:prstGeom prst="rect">
+              <a:avLst/>
+            </a:prstGeom>
+            <a:solidFill>
+              <a:srgbClr val="004C92"/>
+            </a:solidFill>
+            <a:ln>
+              <a:noFill/>
+            </a:ln>
+          </p:spPr>
+          <p:style>
+            <a:lnRef idx="2">
+              <a:schemeClr val="accent1">
+                <a:shade val="50000"/>
+              </a:schemeClr>
+            </a:lnRef>
+            <a:fillRef idx="1">
+              <a:schemeClr val="accent1"/>
+            </a:fillRef>
+            <a:effectRef idx="0">
+              <a:schemeClr val="accent1"/>
+            </a:effectRef>
+            <a:fontRef idx="minor">
+              <a:schemeClr val="lt1"/>
+            </a:fontRef>
+          </p:style>
+          <p:txBody>
+            <a:bodyPr rtlCol="0" anchor="ctr"/>
+            <a:lstStyle/>
+            <a:p>
+              <a:pPr algn="ctr"/>
+              <a:endParaRPr lang="en-US"/>
+            </a:p>
+          </p:txBody>
+        </p:sp>
+        <p:sp>
+          <p:nvSpPr>
+            <p:cNvPr id="52" name="Rectangle 51"/>
+            <p:cNvSpPr/>
+            <p:nvPr/>
+          </p:nvSpPr>
+          <p:spPr>
+            <a:xfrm>
+              <a:off x="25522800" y="25368230"/>
+              <a:ext cx="639723" cy="338670"/>
+            </a:xfrm>
+            <a:prstGeom prst="rect">
+              <a:avLst/>
+            </a:prstGeom>
+            <a:solidFill>
+              <a:schemeClr val="bg1">
+                <a:lumMod val="50000"/>
+              </a:schemeClr>
+            </a:solidFill>
+            <a:ln>
+              <a:noFill/>
+            </a:ln>
+          </p:spPr>
+          <p:style>
+            <a:lnRef idx="2">
+              <a:schemeClr val="accent1">
+                <a:shade val="50000"/>
+              </a:schemeClr>
+            </a:lnRef>
+            <a:fillRef idx="1">
+              <a:schemeClr val="accent1"/>
+            </a:fillRef>
+            <a:effectRef idx="0">
+              <a:schemeClr val="accent1"/>
+            </a:effectRef>
+            <a:fontRef idx="minor">
+              <a:schemeClr val="lt1"/>
+            </a:fontRef>
+          </p:style>
+          <p:txBody>
+            <a:bodyPr rtlCol="0" anchor="ctr"/>
+            <a:lstStyle/>
+            <a:p>
+              <a:pPr algn="ctr"/>
+              <a:endParaRPr lang="en-US"/>
+            </a:p>
+          </p:txBody>
+        </p:sp>
+        <p:sp>
+          <p:nvSpPr>
+            <p:cNvPr id="22" name="TextBox 21"/>
+            <p:cNvSpPr txBox="1"/>
+            <p:nvPr/>
+          </p:nvSpPr>
+          <p:spPr>
+            <a:xfrm>
+              <a:off x="26308050" y="24749493"/>
+              <a:ext cx="1257300" cy="492443"/>
+            </a:xfrm>
+            <a:prstGeom prst="rect">
+              <a:avLst/>
+            </a:prstGeom>
+            <a:noFill/>
+          </p:spPr>
+          <p:txBody>
+            <a:bodyPr wrap="square" rtlCol="0">
+              <a:spAutoFit/>
+            </a:bodyPr>
+            <a:lstStyle/>
+            <a:p>
+              <a:r>
+                <a:rPr lang="en-US" sz="2600" dirty="0" smtClean="0"/>
+                <a:t>Native</a:t>
+              </a:r>
+              <a:endParaRPr lang="en-US" sz="2600" dirty="0"/>
+            </a:p>
+          </p:txBody>
+        </p:sp>
+        <p:sp>
+          <p:nvSpPr>
+            <p:cNvPr id="53" name="TextBox 52"/>
+            <p:cNvSpPr txBox="1"/>
+            <p:nvPr/>
+          </p:nvSpPr>
+          <p:spPr>
+            <a:xfrm>
+              <a:off x="26308050" y="25241936"/>
+              <a:ext cx="1257300" cy="492443"/>
+            </a:xfrm>
+            <a:prstGeom prst="rect">
+              <a:avLst/>
+            </a:prstGeom>
+            <a:noFill/>
+          </p:spPr>
+          <p:txBody>
+            <a:bodyPr wrap="square" rtlCol="0">
+              <a:spAutoFit/>
+            </a:bodyPr>
+            <a:lstStyle/>
+            <a:p>
+              <a:r>
+                <a:rPr lang="en-US" sz="2600" dirty="0" smtClean="0"/>
+                <a:t>Absent</a:t>
+              </a:r>
+              <a:endParaRPr lang="en-US" sz="2600" dirty="0"/>
+            </a:p>
+          </p:txBody>
+        </p:sp>
+      </p:grpSp>
+      <p:sp>
+        <p:nvSpPr>
+          <p:cNvPr id="24" name="TextBox 23"/>
+          <p:cNvSpPr txBox="1"/>
+          <p:nvPr/>
+        </p:nvSpPr>
+        <p:spPr>
+          <a:xfrm>
+            <a:off x="24603734" y="17820460"/>
+            <a:ext cx="7232815" cy="523220"/>
+          </a:xfrm>
+          <a:prstGeom prst="rect">
+            <a:avLst/>
+          </a:prstGeom>
+          <a:noFill/>
+        </p:spPr>
+        <p:txBody>
+          <a:bodyPr wrap="square" rtlCol="0">
+            <a:spAutoFit/>
+          </a:bodyPr>
+          <a:lstStyle/>
+          <a:p>
+            <a:r>
+              <a:rPr lang="en-US" sz="2800" b="1" i="1" dirty="0" err="1" smtClean="0"/>
+              <a:t>Culex</a:t>
+            </a:r>
+            <a:r>
+              <a:rPr lang="en-US" sz="2800" b="1" i="1" dirty="0" smtClean="0"/>
+              <a:t> </a:t>
+            </a:r>
+            <a:r>
+              <a:rPr lang="en-US" sz="2800" b="1" i="1" dirty="0" err="1" smtClean="0"/>
+              <a:t>tarsalis</a:t>
+            </a:r>
+            <a:r>
+              <a:rPr lang="en-US" sz="2800" b="1" i="1" dirty="0" smtClean="0"/>
+              <a:t> </a:t>
+            </a:r>
+            <a:r>
+              <a:rPr lang="en-US" sz="2800" b="1" dirty="0" smtClean="0"/>
+              <a:t>Present in Samples</a:t>
+            </a:r>
+            <a:endParaRPr lang="en-US" sz="2800" b="1" dirty="0"/>
+          </a:p>
+        </p:txBody>
+      </p:sp>
+      <p:sp>
+        <p:nvSpPr>
+          <p:cNvPr id="28" name="Oval 27"/>
           <p:cNvSpPr/>
           <p:nvPr/>
         </p:nvSpPr>
         <p:spPr>
-          <a:xfrm rot="16200000">
-            <a:off x="3968904" y="11546141"/>
-            <a:ext cx="4047523" cy="7350089"/>
+          <a:xfrm>
+            <a:off x="24589976" y="18628049"/>
+            <a:ext cx="395671" cy="385011"/>
           </a:xfrm>
-          <a:prstGeom prst="rect">
+          <a:prstGeom prst="ellipse">
             <a:avLst/>
           </a:prstGeom>
           <a:solidFill>
-            <a:schemeClr val="bg2"/>
+            <a:srgbClr val="00B0F0"/>
           </a:solidFill>
           <a:ln>
             <a:noFill/>
           </a:ln>
         </p:spPr>
         <p:style>
-          <a:lnRef idx="1">
-            <a:schemeClr val="accent2"/>
+          <a:lnRef idx="2">
+            <a:schemeClr val="accent1">
+              <a:shade val="50000"/>
+            </a:schemeClr>
           </a:lnRef>
-          <a:fillRef idx="2">
-            <a:schemeClr val="accent2"/>
+          <a:fillRef idx="1">
+            <a:schemeClr val="accent1"/>
           </a:fillRef>
-          <a:effectRef idx="1">
-            <a:schemeClr val="accent2"/>
+          <a:effectRef idx="0">
+            <a:schemeClr val="accent1"/>
           </a:effectRef>
           <a:fontRef idx="minor">
-            <a:schemeClr val="dk1"/>
+            <a:schemeClr val="lt1"/>
           </a:fontRef>
         </p:style>
         <p:txBody>
-          <a:bodyPr wrap="square" rtlCol="0" anchor="ctr">
+          <a:bodyPr rtlCol="0" anchor="ctr"/>
+          <a:lstStyle/>
+          <a:p>
+            <a:pPr algn="ctr"/>
+            <a:endParaRPr lang="en-US"/>
+          </a:p>
+        </p:txBody>
+      </p:sp>
+      <p:sp>
+        <p:nvSpPr>
+          <p:cNvPr id="54" name="Oval 53"/>
+          <p:cNvSpPr/>
+          <p:nvPr/>
+        </p:nvSpPr>
+        <p:spPr>
+          <a:xfrm>
+            <a:off x="24597579" y="19351145"/>
+            <a:ext cx="395671" cy="385011"/>
+          </a:xfrm>
+          <a:prstGeom prst="ellipse">
+            <a:avLst/>
+          </a:prstGeom>
+          <a:solidFill>
+            <a:srgbClr val="FF5050"/>
+          </a:solidFill>
+          <a:ln>
+            <a:noFill/>
+          </a:ln>
+        </p:spPr>
+        <p:style>
+          <a:lnRef idx="2">
+            <a:schemeClr val="accent1">
+              <a:shade val="50000"/>
+            </a:schemeClr>
+          </a:lnRef>
+          <a:fillRef idx="1">
+            <a:schemeClr val="accent1"/>
+          </a:fillRef>
+          <a:effectRef idx="0">
+            <a:schemeClr val="accent1"/>
+          </a:effectRef>
+          <a:fontRef idx="minor">
+            <a:schemeClr val="lt1"/>
+          </a:fontRef>
+        </p:style>
+        <p:txBody>
+          <a:bodyPr rtlCol="0" anchor="ctr"/>
+          <a:lstStyle/>
+          <a:p>
+            <a:pPr algn="ctr"/>
+            <a:endParaRPr lang="en-US"/>
+          </a:p>
+        </p:txBody>
+      </p:sp>
+      <p:sp>
+        <p:nvSpPr>
+          <p:cNvPr id="55" name="TextBox 54"/>
+          <p:cNvSpPr txBox="1"/>
+          <p:nvPr/>
+        </p:nvSpPr>
+        <p:spPr>
+          <a:xfrm>
+            <a:off x="25193205" y="18574333"/>
+            <a:ext cx="1453079" cy="492443"/>
+          </a:xfrm>
+          <a:prstGeom prst="rect">
+            <a:avLst/>
+          </a:prstGeom>
+          <a:noFill/>
+        </p:spPr>
+        <p:txBody>
+          <a:bodyPr wrap="square" rtlCol="0">
             <a:spAutoFit/>
           </a:bodyPr>
           <a:lstStyle/>
           <a:p>
-            <a:pPr algn="ctr"/>
-            <a:endParaRPr lang="en-US" sz="3600" b="1" baseline="0" dirty="0" smtClean="0">
-              <a:solidFill>
-                <a:schemeClr val="bg1"/>
-              </a:solidFill>
-              <a:latin typeface="Calibri" pitchFamily="34" charset="0"/>
-            </a:endParaRPr>
+            <a:r>
+              <a:rPr lang="en-US" sz="2600" dirty="0" smtClean="0"/>
+              <a:t>Present</a:t>
+            </a:r>
+            <a:endParaRPr lang="en-US" sz="2600" dirty="0"/>
           </a:p>
         </p:txBody>
       </p:sp>
+      <p:sp>
+        <p:nvSpPr>
+          <p:cNvPr id="56" name="TextBox 55"/>
+          <p:cNvSpPr txBox="1"/>
+          <p:nvPr/>
+        </p:nvSpPr>
+        <p:spPr>
+          <a:xfrm>
+            <a:off x="25193205" y="19297429"/>
+            <a:ext cx="2054660" cy="492443"/>
+          </a:xfrm>
+          <a:prstGeom prst="rect">
+            <a:avLst/>
+          </a:prstGeom>
+          <a:noFill/>
+        </p:spPr>
+        <p:txBody>
+          <a:bodyPr wrap="square" rtlCol="0">
+            <a:spAutoFit/>
+          </a:bodyPr>
+          <a:lstStyle/>
+          <a:p>
+            <a:r>
+              <a:rPr lang="en-US" sz="2600" dirty="0" smtClean="0"/>
+              <a:t>Not Present</a:t>
+            </a:r>
+            <a:endParaRPr lang="en-US" sz="2600" dirty="0"/>
+          </a:p>
+        </p:txBody>
+      </p:sp>
+      <p:sp>
+        <p:nvSpPr>
+          <p:cNvPr id="34" name="TextBox 33"/>
+          <p:cNvSpPr txBox="1"/>
+          <p:nvPr/>
+        </p:nvSpPr>
+        <p:spPr>
+          <a:xfrm>
+            <a:off x="24604915" y="20145274"/>
+            <a:ext cx="7437185" cy="2246769"/>
+          </a:xfrm>
+          <a:prstGeom prst="rect">
+            <a:avLst/>
+          </a:prstGeom>
+          <a:noFill/>
+        </p:spPr>
+        <p:txBody>
+          <a:bodyPr wrap="square" rtlCol="0">
+            <a:spAutoFit/>
+          </a:bodyPr>
+          <a:lstStyle/>
+          <a:p>
+            <a:r>
+              <a:rPr lang="en-US" sz="2800" b="1" dirty="0" smtClean="0"/>
+              <a:t>Figure 5. </a:t>
+            </a:r>
+            <a:r>
+              <a:rPr lang="en-US" sz="2800" i="1" dirty="0" smtClean="0"/>
+              <a:t>Map of the range of </a:t>
+            </a:r>
+            <a:r>
+              <a:rPr lang="en-US" sz="2800" i="1" dirty="0" err="1" smtClean="0"/>
+              <a:t>Culex</a:t>
+            </a:r>
+            <a:r>
+              <a:rPr lang="en-US" sz="2800" i="1" dirty="0" smtClean="0"/>
+              <a:t> </a:t>
+            </a:r>
+            <a:r>
+              <a:rPr lang="en-US" sz="2800" i="1" dirty="0" err="1" smtClean="0"/>
+              <a:t>tarsalis</a:t>
+            </a:r>
+            <a:r>
+              <a:rPr lang="en-US" sz="2800" i="1" dirty="0" smtClean="0"/>
+              <a:t>. White lines indicate NEON domain boundaries and  dots are NEON sampling sites. Data used to generate this map was collected from the years 2014 and 2016. </a:t>
+            </a:r>
+            <a:endParaRPr lang="en-US" sz="2800" i="1" dirty="0"/>
+          </a:p>
+        </p:txBody>
+      </p:sp>
+      <p:grpSp>
+        <p:nvGrpSpPr>
+          <p:cNvPr id="58" name="Group 57"/>
+          <p:cNvGrpSpPr/>
+          <p:nvPr/>
+        </p:nvGrpSpPr>
+        <p:grpSpPr>
+          <a:xfrm>
+            <a:off x="24589976" y="23536979"/>
+            <a:ext cx="2042550" cy="984886"/>
+            <a:chOff x="25522800" y="24749493"/>
+            <a:chExt cx="2042550" cy="984886"/>
+          </a:xfrm>
+        </p:grpSpPr>
+        <p:sp>
+          <p:nvSpPr>
+            <p:cNvPr id="62" name="Rectangle 61"/>
+            <p:cNvSpPr/>
+            <p:nvPr/>
+          </p:nvSpPr>
+          <p:spPr>
+            <a:xfrm>
+              <a:off x="25522800" y="24826380"/>
+              <a:ext cx="639723" cy="338670"/>
+            </a:xfrm>
+            <a:prstGeom prst="rect">
+              <a:avLst/>
+            </a:prstGeom>
+            <a:solidFill>
+              <a:schemeClr val="tx1">
+                <a:lumMod val="75000"/>
+                <a:lumOff val="25000"/>
+              </a:schemeClr>
+            </a:solidFill>
+            <a:ln>
+              <a:solidFill>
+                <a:schemeClr val="tx1"/>
+              </a:solidFill>
+            </a:ln>
+          </p:spPr>
+          <p:style>
+            <a:lnRef idx="2">
+              <a:schemeClr val="accent1">
+                <a:shade val="50000"/>
+              </a:schemeClr>
+            </a:lnRef>
+            <a:fillRef idx="1">
+              <a:schemeClr val="accent1"/>
+            </a:fillRef>
+            <a:effectRef idx="0">
+              <a:schemeClr val="accent1"/>
+            </a:effectRef>
+            <a:fontRef idx="minor">
+              <a:schemeClr val="lt1"/>
+            </a:fontRef>
+          </p:style>
+          <p:txBody>
+            <a:bodyPr rtlCol="0" anchor="ctr"/>
+            <a:lstStyle/>
+            <a:p>
+              <a:pPr algn="ctr"/>
+              <a:endParaRPr lang="en-US"/>
+            </a:p>
+          </p:txBody>
+        </p:sp>
+        <p:sp>
+          <p:nvSpPr>
+            <p:cNvPr id="64" name="Rectangle 63"/>
+            <p:cNvSpPr/>
+            <p:nvPr/>
+          </p:nvSpPr>
+          <p:spPr>
+            <a:xfrm>
+              <a:off x="25522800" y="25368230"/>
+              <a:ext cx="639723" cy="338670"/>
+            </a:xfrm>
+            <a:prstGeom prst="rect">
+              <a:avLst/>
+            </a:prstGeom>
+            <a:solidFill>
+              <a:schemeClr val="bg1"/>
+            </a:solidFill>
+            <a:ln>
+              <a:solidFill>
+                <a:schemeClr val="tx1"/>
+              </a:solidFill>
+            </a:ln>
+          </p:spPr>
+          <p:style>
+            <a:lnRef idx="2">
+              <a:schemeClr val="accent1">
+                <a:shade val="50000"/>
+              </a:schemeClr>
+            </a:lnRef>
+            <a:fillRef idx="1">
+              <a:schemeClr val="accent1"/>
+            </a:fillRef>
+            <a:effectRef idx="0">
+              <a:schemeClr val="accent1"/>
+            </a:effectRef>
+            <a:fontRef idx="minor">
+              <a:schemeClr val="lt1"/>
+            </a:fontRef>
+          </p:style>
+          <p:txBody>
+            <a:bodyPr rtlCol="0" anchor="ctr"/>
+            <a:lstStyle/>
+            <a:p>
+              <a:pPr algn="ctr"/>
+              <a:endParaRPr lang="en-US"/>
+            </a:p>
+          </p:txBody>
+        </p:sp>
+        <p:sp>
+          <p:nvSpPr>
+            <p:cNvPr id="65" name="TextBox 64"/>
+            <p:cNvSpPr txBox="1"/>
+            <p:nvPr/>
+          </p:nvSpPr>
+          <p:spPr>
+            <a:xfrm>
+              <a:off x="26308050" y="24749493"/>
+              <a:ext cx="1257300" cy="492443"/>
+            </a:xfrm>
+            <a:prstGeom prst="rect">
+              <a:avLst/>
+            </a:prstGeom>
+            <a:noFill/>
+            <a:ln>
+              <a:noFill/>
+            </a:ln>
+          </p:spPr>
+          <p:txBody>
+            <a:bodyPr wrap="square" rtlCol="0">
+              <a:spAutoFit/>
+            </a:bodyPr>
+            <a:lstStyle/>
+            <a:p>
+              <a:r>
+                <a:rPr lang="en-US" sz="2600" dirty="0" smtClean="0"/>
+                <a:t>Native</a:t>
+              </a:r>
+              <a:endParaRPr lang="en-US" sz="2600" dirty="0"/>
+            </a:p>
+          </p:txBody>
+        </p:sp>
+        <p:sp>
+          <p:nvSpPr>
+            <p:cNvPr id="66" name="TextBox 65"/>
+            <p:cNvSpPr txBox="1"/>
+            <p:nvPr/>
+          </p:nvSpPr>
+          <p:spPr>
+            <a:xfrm>
+              <a:off x="26308050" y="25241936"/>
+              <a:ext cx="1257300" cy="492443"/>
+            </a:xfrm>
+            <a:prstGeom prst="rect">
+              <a:avLst/>
+            </a:prstGeom>
+            <a:noFill/>
+            <a:ln>
+              <a:noFill/>
+            </a:ln>
+          </p:spPr>
+          <p:txBody>
+            <a:bodyPr wrap="square" rtlCol="0">
+              <a:spAutoFit/>
+            </a:bodyPr>
+            <a:lstStyle/>
+            <a:p>
+              <a:r>
+                <a:rPr lang="en-US" sz="2600" dirty="0" smtClean="0"/>
+                <a:t>Absent</a:t>
+              </a:r>
+              <a:endParaRPr lang="en-US" sz="2600" dirty="0"/>
+            </a:p>
+          </p:txBody>
+        </p:sp>
+      </p:grpSp>
+      <p:sp>
+        <p:nvSpPr>
+          <p:cNvPr id="67" name="TextBox 66"/>
+          <p:cNvSpPr txBox="1"/>
+          <p:nvPr/>
+        </p:nvSpPr>
+        <p:spPr>
+          <a:xfrm>
+            <a:off x="24604915" y="22825794"/>
+            <a:ext cx="3315514" cy="523220"/>
+          </a:xfrm>
+          <a:prstGeom prst="rect">
+            <a:avLst/>
+          </a:prstGeom>
+          <a:noFill/>
+        </p:spPr>
+        <p:txBody>
+          <a:bodyPr wrap="square" rtlCol="0">
+            <a:spAutoFit/>
+          </a:bodyPr>
+          <a:lstStyle/>
+          <a:p>
+            <a:r>
+              <a:rPr lang="en-US" sz="2800" b="1" dirty="0" smtClean="0"/>
+              <a:t>Native Status </a:t>
+            </a:r>
+            <a:endParaRPr lang="en-US" sz="2800" b="1" dirty="0"/>
+          </a:p>
+        </p:txBody>
+      </p:sp>
+      <p:sp>
+        <p:nvSpPr>
+          <p:cNvPr id="57" name="TextBox 56"/>
+          <p:cNvSpPr txBox="1"/>
+          <p:nvPr/>
+        </p:nvSpPr>
+        <p:spPr>
+          <a:xfrm>
+            <a:off x="24589976" y="25017318"/>
+            <a:ext cx="5925253" cy="2246769"/>
+          </a:xfrm>
+          <a:prstGeom prst="rect">
+            <a:avLst/>
+          </a:prstGeom>
+          <a:noFill/>
+        </p:spPr>
+        <p:txBody>
+          <a:bodyPr wrap="square" rtlCol="0">
+            <a:spAutoFit/>
+          </a:bodyPr>
+          <a:lstStyle/>
+          <a:p>
+            <a:r>
+              <a:rPr lang="en-US" sz="2800" b="1" dirty="0" smtClean="0"/>
+              <a:t>Figure 6. </a:t>
+            </a:r>
+            <a:r>
+              <a:rPr lang="en-US" sz="2800" i="1" dirty="0" smtClean="0"/>
+              <a:t>Map of the range of </a:t>
+            </a:r>
+            <a:r>
+              <a:rPr lang="en-US" sz="2800" i="1" dirty="0" err="1" smtClean="0"/>
+              <a:t>Culex</a:t>
+            </a:r>
+            <a:r>
+              <a:rPr lang="en-US" sz="2800" i="1" dirty="0" smtClean="0"/>
+              <a:t> </a:t>
+            </a:r>
+            <a:r>
+              <a:rPr lang="en-US" sz="2800" i="1" dirty="0" err="1" smtClean="0"/>
+              <a:t>tarsalis</a:t>
+            </a:r>
+            <a:r>
+              <a:rPr lang="en-US" sz="2800" i="1" dirty="0" smtClean="0"/>
+              <a:t> from “Identification and Geographical Distribution of the Mosquitoes of North America, North of Mexico” published in 2005</a:t>
+            </a:r>
+            <a:r>
+              <a:rPr lang="en-US" sz="2800" i="1" baseline="30000" dirty="0" smtClean="0"/>
+              <a:t>4</a:t>
+            </a:r>
+            <a:r>
+              <a:rPr lang="en-US" sz="2800" i="1" dirty="0" smtClean="0"/>
+              <a:t>. </a:t>
+            </a:r>
+            <a:endParaRPr lang="en-US" sz="2800" i="1" baseline="30000" dirty="0"/>
+          </a:p>
+        </p:txBody>
+      </p:sp>
+      <p:pic>
+        <p:nvPicPr>
+          <p:cNvPr id="71" name="Picture 70"/>
+          <p:cNvPicPr>
+            <a:picLocks noChangeAspect="1"/>
+          </p:cNvPicPr>
+          <p:nvPr/>
+        </p:nvPicPr>
+        <p:blipFill rotWithShape="1">
+          <a:blip r:embed="rId8" cstate="print">
+            <a:extLst>
+              <a:ext uri="{28A0092B-C50C-407E-A947-70E740481C1C}">
+                <a14:useLocalDpi xmlns:a14="http://schemas.microsoft.com/office/drawing/2010/main" val="0"/>
+              </a:ext>
+            </a:extLst>
+          </a:blip>
+          <a:srcRect b="10940"/>
+          <a:stretch/>
+        </p:blipFill>
+        <p:spPr>
+          <a:xfrm>
+            <a:off x="11841894" y="22924827"/>
+            <a:ext cx="12332556" cy="6431753"/>
+          </a:xfrm>
+          <a:prstGeom prst="rect">
+            <a:avLst/>
+          </a:prstGeom>
+        </p:spPr>
+      </p:pic>
     </p:spTree>
     <p:extLst>
       <p:ext uri="{BB962C8B-B14F-4D97-AF65-F5344CB8AC3E}">
@@ -4394,14 +5940,14 @@
 <ds:datastoreItem xmlns:ds="http://schemas.openxmlformats.org/officeDocument/2006/customXml" ds:itemID="{9594DFF2-C628-43CC-A584-EA39B3AE16B2}">
   <ds:schemaRefs>
     <ds:schemaRef ds:uri="http://schemas.microsoft.com/office/2006/documentManagement/types"/>
+    <ds:schemaRef ds:uri="http://purl.org/dc/dcmitype/"/>
+    <ds:schemaRef ds:uri="http://schemas.openxmlformats.org/package/2006/metadata/core-properties"/>
+    <ds:schemaRef ds:uri="http://schemas.microsoft.com/office/2006/metadata/properties"/>
+    <ds:schemaRef ds:uri="http://www.w3.org/XML/1998/namespace"/>
     <ds:schemaRef ds:uri="eff24bd8-0971-442c-8d07-8938bacad241"/>
+    <ds:schemaRef ds:uri="http://purl.org/dc/terms/"/>
     <ds:schemaRef ds:uri="http://schemas.microsoft.com/office/infopath/2007/PartnerControls"/>
     <ds:schemaRef ds:uri="http://purl.org/dc/elements/1.1/"/>
-    <ds:schemaRef ds:uri="http://schemas.openxmlformats.org/package/2006/metadata/core-properties"/>
-    <ds:schemaRef ds:uri="http://purl.org/dc/terms/"/>
-    <ds:schemaRef ds:uri="http://schemas.microsoft.com/office/2006/metadata/properties"/>
-    <ds:schemaRef ds:uri="http://www.w3.org/XML/1998/namespace"/>
-    <ds:schemaRef ds:uri="http://purl.org/dc/dcmitype/"/>
   </ds:schemaRefs>
 </ds:datastoreItem>
 </file>

</xml_diff>